<commit_message>
update doc and slide
</commit_message>
<xml_diff>
--- a/108539.pptx
+++ b/108539.pptx
@@ -5,7 +5,7 @@
     <p:sldMasterId id="2147483659" r:id="rId1"/>
   </p:sldMasterIdLst>
   <p:notesMasterIdLst>
-    <p:notesMasterId r:id="rId22"/>
+    <p:notesMasterId r:id="rId26"/>
   </p:notesMasterIdLst>
   <p:sldIdLst>
     <p:sldId id="256" r:id="rId2"/>
@@ -26,16 +26,20 @@
     <p:sldId id="268" r:id="rId17"/>
     <p:sldId id="269" r:id="rId18"/>
     <p:sldId id="270" r:id="rId19"/>
-    <p:sldId id="271" r:id="rId20"/>
-    <p:sldId id="272" r:id="rId21"/>
+    <p:sldId id="276" r:id="rId20"/>
+    <p:sldId id="277" r:id="rId21"/>
+    <p:sldId id="278" r:id="rId22"/>
+    <p:sldId id="279" r:id="rId23"/>
+    <p:sldId id="271" r:id="rId24"/>
+    <p:sldId id="272" r:id="rId25"/>
   </p:sldIdLst>
   <p:sldSz cx="12192000" cy="6858000"/>
   <p:notesSz cx="6858000" cy="9144000"/>
   <p:embeddedFontLst>
     <p:embeddedFont>
       <p:font typeface="Gill Sans" panose="020B0604020202020204" charset="0"/>
-      <p:regular r:id="rId23"/>
-      <p:bold r:id="rId24"/>
+      <p:regular r:id="rId27"/>
+      <p:bold r:id="rId28"/>
     </p:embeddedFont>
   </p:embeddedFontLst>
   <p:defaultTextStyle>
@@ -1775,7 +1779,7 @@
   <p:cSld>
     <p:spTree>
       <p:nvGrpSpPr>
-        <p:cNvPr id="1" name="Shape 194"/>
+        <p:cNvPr id="1" name="Shape 176"/>
         <p:cNvGrpSpPr/>
         <p:nvPr/>
       </p:nvGrpSpPr>
@@ -1789,7 +1793,7 @@
       </p:grpSpPr>
       <p:sp>
         <p:nvSpPr>
-          <p:cNvPr id="195" name="Google Shape;195;p7:notes"/>
+          <p:cNvPr id="177" name="Google Shape;177;g58249000b4_0_1:notes"/>
           <p:cNvSpPr txBox="1">
             <a:spLocks noGrp="1"/>
           </p:cNvSpPr>
@@ -1827,7 +1831,7 @@
       </p:sp>
       <p:sp>
         <p:nvSpPr>
-          <p:cNvPr id="196" name="Google Shape;196;p7:notes"/>
+          <p:cNvPr id="178" name="Google Shape;178;g58249000b4_0_1:notes"/>
           <p:cNvSpPr>
             <a:spLocks noGrp="1" noRot="1" noChangeAspect="1"/>
           </p:cNvSpPr>
@@ -1867,6 +1871,11 @@
         </p:spPr>
       </p:sp>
     </p:spTree>
+    <p:extLst>
+      <p:ext uri="{BB962C8B-B14F-4D97-AF65-F5344CB8AC3E}">
+        <p14:creationId xmlns:p14="http://schemas.microsoft.com/office/powerpoint/2010/main" val="167758659"/>
+      </p:ext>
+    </p:extLst>
   </p:cSld>
   <p:clrMapOvr>
     <a:masterClrMapping/>
@@ -1979,6 +1988,437 @@
 </file>
 
 <file path=ppt/notesSlides/notesSlide20.xml><?xml version="1.0" encoding="utf-8"?>
+<p:notes xmlns:a="http://schemas.openxmlformats.org/drawingml/2006/main" xmlns:r="http://schemas.openxmlformats.org/officeDocument/2006/relationships" xmlns:p="http://schemas.openxmlformats.org/presentationml/2006/main" showMasterSp="0" showMasterPhAnim="0">
+  <p:cSld>
+    <p:spTree>
+      <p:nvGrpSpPr>
+        <p:cNvPr id="1" name="Shape 176"/>
+        <p:cNvGrpSpPr/>
+        <p:nvPr/>
+      </p:nvGrpSpPr>
+      <p:grpSpPr>
+        <a:xfrm>
+          <a:off x="0" y="0"/>
+          <a:ext cx="0" cy="0"/>
+          <a:chOff x="0" y="0"/>
+          <a:chExt cx="0" cy="0"/>
+        </a:xfrm>
+      </p:grpSpPr>
+      <p:sp>
+        <p:nvSpPr>
+          <p:cNvPr id="177" name="Google Shape;177;g58249000b4_0_1:notes"/>
+          <p:cNvSpPr txBox="1">
+            <a:spLocks noGrp="1"/>
+          </p:cNvSpPr>
+          <p:nvPr>
+            <p:ph type="body" idx="1"/>
+          </p:nvPr>
+        </p:nvSpPr>
+        <p:spPr>
+          <a:xfrm>
+            <a:off x="685800" y="4343400"/>
+            <a:ext cx="5486400" cy="4114800"/>
+          </a:xfrm>
+          <a:prstGeom prst="rect">
+            <a:avLst/>
+          </a:prstGeom>
+        </p:spPr>
+        <p:txBody>
+          <a:bodyPr spcFirstLastPara="1" wrap="square" lIns="91425" tIns="91425" rIns="91425" bIns="91425" anchor="t" anchorCtr="0">
+            <a:noAutofit/>
+          </a:bodyPr>
+          <a:lstStyle/>
+          <a:p>
+            <a:pPr marL="0" lvl="0" indent="0" algn="l" rtl="0">
+              <a:spcBef>
+                <a:spcPts val="0"/>
+              </a:spcBef>
+              <a:spcAft>
+                <a:spcPts val="0"/>
+              </a:spcAft>
+              <a:buNone/>
+            </a:pPr>
+            <a:endParaRPr/>
+          </a:p>
+        </p:txBody>
+      </p:sp>
+      <p:sp>
+        <p:nvSpPr>
+          <p:cNvPr id="178" name="Google Shape;178;g58249000b4_0_1:notes"/>
+          <p:cNvSpPr>
+            <a:spLocks noGrp="1" noRot="1" noChangeAspect="1"/>
+          </p:cNvSpPr>
+          <p:nvPr>
+            <p:ph type="sldImg" idx="2"/>
+          </p:nvPr>
+        </p:nvSpPr>
+        <p:spPr>
+          <a:xfrm>
+            <a:off x="381000" y="685800"/>
+            <a:ext cx="6096000" cy="3429000"/>
+          </a:xfrm>
+          <a:custGeom>
+            <a:avLst/>
+            <a:gdLst/>
+            <a:ahLst/>
+            <a:cxnLst/>
+            <a:rect l="l" t="t" r="r" b="b"/>
+            <a:pathLst>
+              <a:path w="120000" h="120000" extrusionOk="0">
+                <a:moveTo>
+                  <a:pt x="0" y="0"/>
+                </a:moveTo>
+                <a:lnTo>
+                  <a:pt x="120000" y="0"/>
+                </a:lnTo>
+                <a:lnTo>
+                  <a:pt x="120000" y="120000"/>
+                </a:lnTo>
+                <a:lnTo>
+                  <a:pt x="0" y="120000"/>
+                </a:lnTo>
+                <a:close/>
+              </a:path>
+            </a:pathLst>
+          </a:custGeom>
+        </p:spPr>
+      </p:sp>
+    </p:spTree>
+    <p:extLst>
+      <p:ext uri="{BB962C8B-B14F-4D97-AF65-F5344CB8AC3E}">
+        <p14:creationId xmlns:p14="http://schemas.microsoft.com/office/powerpoint/2010/main" val="1174623778"/>
+      </p:ext>
+    </p:extLst>
+  </p:cSld>
+  <p:clrMapOvr>
+    <a:masterClrMapping/>
+  </p:clrMapOvr>
+</p:notes>
+</file>
+
+<file path=ppt/notesSlides/notesSlide21.xml><?xml version="1.0" encoding="utf-8"?>
+<p:notes xmlns:a="http://schemas.openxmlformats.org/drawingml/2006/main" xmlns:r="http://schemas.openxmlformats.org/officeDocument/2006/relationships" xmlns:p="http://schemas.openxmlformats.org/presentationml/2006/main" showMasterSp="0" showMasterPhAnim="0">
+  <p:cSld>
+    <p:spTree>
+      <p:nvGrpSpPr>
+        <p:cNvPr id="1" name="Shape 176"/>
+        <p:cNvGrpSpPr/>
+        <p:nvPr/>
+      </p:nvGrpSpPr>
+      <p:grpSpPr>
+        <a:xfrm>
+          <a:off x="0" y="0"/>
+          <a:ext cx="0" cy="0"/>
+          <a:chOff x="0" y="0"/>
+          <a:chExt cx="0" cy="0"/>
+        </a:xfrm>
+      </p:grpSpPr>
+      <p:sp>
+        <p:nvSpPr>
+          <p:cNvPr id="177" name="Google Shape;177;g58249000b4_0_1:notes"/>
+          <p:cNvSpPr txBox="1">
+            <a:spLocks noGrp="1"/>
+          </p:cNvSpPr>
+          <p:nvPr>
+            <p:ph type="body" idx="1"/>
+          </p:nvPr>
+        </p:nvSpPr>
+        <p:spPr>
+          <a:xfrm>
+            <a:off x="685800" y="4343400"/>
+            <a:ext cx="5486400" cy="4114800"/>
+          </a:xfrm>
+          <a:prstGeom prst="rect">
+            <a:avLst/>
+          </a:prstGeom>
+        </p:spPr>
+        <p:txBody>
+          <a:bodyPr spcFirstLastPara="1" wrap="square" lIns="91425" tIns="91425" rIns="91425" bIns="91425" anchor="t" anchorCtr="0">
+            <a:noAutofit/>
+          </a:bodyPr>
+          <a:lstStyle/>
+          <a:p>
+            <a:pPr marL="0" lvl="0" indent="0" algn="l" rtl="0">
+              <a:spcBef>
+                <a:spcPts val="0"/>
+              </a:spcBef>
+              <a:spcAft>
+                <a:spcPts val="0"/>
+              </a:spcAft>
+              <a:buNone/>
+            </a:pPr>
+            <a:endParaRPr/>
+          </a:p>
+        </p:txBody>
+      </p:sp>
+      <p:sp>
+        <p:nvSpPr>
+          <p:cNvPr id="178" name="Google Shape;178;g58249000b4_0_1:notes"/>
+          <p:cNvSpPr>
+            <a:spLocks noGrp="1" noRot="1" noChangeAspect="1"/>
+          </p:cNvSpPr>
+          <p:nvPr>
+            <p:ph type="sldImg" idx="2"/>
+          </p:nvPr>
+        </p:nvSpPr>
+        <p:spPr>
+          <a:xfrm>
+            <a:off x="381000" y="685800"/>
+            <a:ext cx="6096000" cy="3429000"/>
+          </a:xfrm>
+          <a:custGeom>
+            <a:avLst/>
+            <a:gdLst/>
+            <a:ahLst/>
+            <a:cxnLst/>
+            <a:rect l="l" t="t" r="r" b="b"/>
+            <a:pathLst>
+              <a:path w="120000" h="120000" extrusionOk="0">
+                <a:moveTo>
+                  <a:pt x="0" y="0"/>
+                </a:moveTo>
+                <a:lnTo>
+                  <a:pt x="120000" y="0"/>
+                </a:lnTo>
+                <a:lnTo>
+                  <a:pt x="120000" y="120000"/>
+                </a:lnTo>
+                <a:lnTo>
+                  <a:pt x="0" y="120000"/>
+                </a:lnTo>
+                <a:close/>
+              </a:path>
+            </a:pathLst>
+          </a:custGeom>
+        </p:spPr>
+      </p:sp>
+    </p:spTree>
+    <p:extLst>
+      <p:ext uri="{BB962C8B-B14F-4D97-AF65-F5344CB8AC3E}">
+        <p14:creationId xmlns:p14="http://schemas.microsoft.com/office/powerpoint/2010/main" val="10236654"/>
+      </p:ext>
+    </p:extLst>
+  </p:cSld>
+  <p:clrMapOvr>
+    <a:masterClrMapping/>
+  </p:clrMapOvr>
+</p:notes>
+</file>
+
+<file path=ppt/notesSlides/notesSlide22.xml><?xml version="1.0" encoding="utf-8"?>
+<p:notes xmlns:a="http://schemas.openxmlformats.org/drawingml/2006/main" xmlns:r="http://schemas.openxmlformats.org/officeDocument/2006/relationships" xmlns:p="http://schemas.openxmlformats.org/presentationml/2006/main" showMasterSp="0" showMasterPhAnim="0">
+  <p:cSld>
+    <p:spTree>
+      <p:nvGrpSpPr>
+        <p:cNvPr id="1" name="Shape 176"/>
+        <p:cNvGrpSpPr/>
+        <p:nvPr/>
+      </p:nvGrpSpPr>
+      <p:grpSpPr>
+        <a:xfrm>
+          <a:off x="0" y="0"/>
+          <a:ext cx="0" cy="0"/>
+          <a:chOff x="0" y="0"/>
+          <a:chExt cx="0" cy="0"/>
+        </a:xfrm>
+      </p:grpSpPr>
+      <p:sp>
+        <p:nvSpPr>
+          <p:cNvPr id="177" name="Google Shape;177;g58249000b4_0_1:notes"/>
+          <p:cNvSpPr txBox="1">
+            <a:spLocks noGrp="1"/>
+          </p:cNvSpPr>
+          <p:nvPr>
+            <p:ph type="body" idx="1"/>
+          </p:nvPr>
+        </p:nvSpPr>
+        <p:spPr>
+          <a:xfrm>
+            <a:off x="685800" y="4343400"/>
+            <a:ext cx="5486400" cy="4114800"/>
+          </a:xfrm>
+          <a:prstGeom prst="rect">
+            <a:avLst/>
+          </a:prstGeom>
+        </p:spPr>
+        <p:txBody>
+          <a:bodyPr spcFirstLastPara="1" wrap="square" lIns="91425" tIns="91425" rIns="91425" bIns="91425" anchor="t" anchorCtr="0">
+            <a:noAutofit/>
+          </a:bodyPr>
+          <a:lstStyle/>
+          <a:p>
+            <a:pPr marL="0" lvl="0" indent="0" algn="l" rtl="0">
+              <a:spcBef>
+                <a:spcPts val="0"/>
+              </a:spcBef>
+              <a:spcAft>
+                <a:spcPts val="0"/>
+              </a:spcAft>
+              <a:buNone/>
+            </a:pPr>
+            <a:endParaRPr/>
+          </a:p>
+        </p:txBody>
+      </p:sp>
+      <p:sp>
+        <p:nvSpPr>
+          <p:cNvPr id="178" name="Google Shape;178;g58249000b4_0_1:notes"/>
+          <p:cNvSpPr>
+            <a:spLocks noGrp="1" noRot="1" noChangeAspect="1"/>
+          </p:cNvSpPr>
+          <p:nvPr>
+            <p:ph type="sldImg" idx="2"/>
+          </p:nvPr>
+        </p:nvSpPr>
+        <p:spPr>
+          <a:xfrm>
+            <a:off x="381000" y="685800"/>
+            <a:ext cx="6096000" cy="3429000"/>
+          </a:xfrm>
+          <a:custGeom>
+            <a:avLst/>
+            <a:gdLst/>
+            <a:ahLst/>
+            <a:cxnLst/>
+            <a:rect l="l" t="t" r="r" b="b"/>
+            <a:pathLst>
+              <a:path w="120000" h="120000" extrusionOk="0">
+                <a:moveTo>
+                  <a:pt x="0" y="0"/>
+                </a:moveTo>
+                <a:lnTo>
+                  <a:pt x="120000" y="0"/>
+                </a:lnTo>
+                <a:lnTo>
+                  <a:pt x="120000" y="120000"/>
+                </a:lnTo>
+                <a:lnTo>
+                  <a:pt x="0" y="120000"/>
+                </a:lnTo>
+                <a:close/>
+              </a:path>
+            </a:pathLst>
+          </a:custGeom>
+        </p:spPr>
+      </p:sp>
+    </p:spTree>
+    <p:extLst>
+      <p:ext uri="{BB962C8B-B14F-4D97-AF65-F5344CB8AC3E}">
+        <p14:creationId xmlns:p14="http://schemas.microsoft.com/office/powerpoint/2010/main" val="3015304396"/>
+      </p:ext>
+    </p:extLst>
+  </p:cSld>
+  <p:clrMapOvr>
+    <a:masterClrMapping/>
+  </p:clrMapOvr>
+</p:notes>
+</file>
+
+<file path=ppt/notesSlides/notesSlide23.xml><?xml version="1.0" encoding="utf-8"?>
+<p:notes xmlns:a="http://schemas.openxmlformats.org/drawingml/2006/main" xmlns:r="http://schemas.openxmlformats.org/officeDocument/2006/relationships" xmlns:p="http://schemas.openxmlformats.org/presentationml/2006/main" showMasterSp="0" showMasterPhAnim="0">
+  <p:cSld>
+    <p:spTree>
+      <p:nvGrpSpPr>
+        <p:cNvPr id="1" name="Shape 194"/>
+        <p:cNvGrpSpPr/>
+        <p:nvPr/>
+      </p:nvGrpSpPr>
+      <p:grpSpPr>
+        <a:xfrm>
+          <a:off x="0" y="0"/>
+          <a:ext cx="0" cy="0"/>
+          <a:chOff x="0" y="0"/>
+          <a:chExt cx="0" cy="0"/>
+        </a:xfrm>
+      </p:grpSpPr>
+      <p:sp>
+        <p:nvSpPr>
+          <p:cNvPr id="195" name="Google Shape;195;p7:notes"/>
+          <p:cNvSpPr txBox="1">
+            <a:spLocks noGrp="1"/>
+          </p:cNvSpPr>
+          <p:nvPr>
+            <p:ph type="body" idx="1"/>
+          </p:nvPr>
+        </p:nvSpPr>
+        <p:spPr>
+          <a:xfrm>
+            <a:off x="685800" y="4343400"/>
+            <a:ext cx="5486400" cy="4114800"/>
+          </a:xfrm>
+          <a:prstGeom prst="rect">
+            <a:avLst/>
+          </a:prstGeom>
+        </p:spPr>
+        <p:txBody>
+          <a:bodyPr spcFirstLastPara="1" wrap="square" lIns="91425" tIns="91425" rIns="91425" bIns="91425" anchor="t" anchorCtr="0">
+            <a:noAutofit/>
+          </a:bodyPr>
+          <a:lstStyle/>
+          <a:p>
+            <a:pPr marL="0" lvl="0" indent="0" algn="l" rtl="0">
+              <a:spcBef>
+                <a:spcPts val="0"/>
+              </a:spcBef>
+              <a:spcAft>
+                <a:spcPts val="0"/>
+              </a:spcAft>
+              <a:buNone/>
+            </a:pPr>
+            <a:endParaRPr/>
+          </a:p>
+        </p:txBody>
+      </p:sp>
+      <p:sp>
+        <p:nvSpPr>
+          <p:cNvPr id="196" name="Google Shape;196;p7:notes"/>
+          <p:cNvSpPr>
+            <a:spLocks noGrp="1" noRot="1" noChangeAspect="1"/>
+          </p:cNvSpPr>
+          <p:nvPr>
+            <p:ph type="sldImg" idx="2"/>
+          </p:nvPr>
+        </p:nvSpPr>
+        <p:spPr>
+          <a:xfrm>
+            <a:off x="381000" y="685800"/>
+            <a:ext cx="6096000" cy="3429000"/>
+          </a:xfrm>
+          <a:custGeom>
+            <a:avLst/>
+            <a:gdLst/>
+            <a:ahLst/>
+            <a:cxnLst/>
+            <a:rect l="l" t="t" r="r" b="b"/>
+            <a:pathLst>
+              <a:path w="120000" h="120000" extrusionOk="0">
+                <a:moveTo>
+                  <a:pt x="0" y="0"/>
+                </a:moveTo>
+                <a:lnTo>
+                  <a:pt x="120000" y="0"/>
+                </a:lnTo>
+                <a:lnTo>
+                  <a:pt x="120000" y="120000"/>
+                </a:lnTo>
+                <a:lnTo>
+                  <a:pt x="0" y="120000"/>
+                </a:lnTo>
+                <a:close/>
+              </a:path>
+            </a:pathLst>
+          </a:custGeom>
+        </p:spPr>
+      </p:sp>
+    </p:spTree>
+  </p:cSld>
+  <p:clrMapOvr>
+    <a:masterClrMapping/>
+  </p:clrMapOvr>
+</p:notes>
+</file>
+
+<file path=ppt/notesSlides/notesSlide24.xml><?xml version="1.0" encoding="utf-8"?>
 <p:notes xmlns:a="http://schemas.openxmlformats.org/drawingml/2006/main" xmlns:r="http://schemas.openxmlformats.org/officeDocument/2006/relationships" xmlns:p="http://schemas.openxmlformats.org/presentationml/2006/main" showMasterSp="0" showMasterPhAnim="0">
   <p:cSld>
     <p:spTree>
@@ -14458,7 +14898,7 @@
         <p:fade thruBlk="1"/>
       </p:transition>
     </mc:Choice>
-    <mc:Fallback xmlns="" xmlns:mv="urn:schemas-microsoft-com:mac:vml" xmlns:c="http://schemas.openxmlformats.org/drawingml/2006/chart" xmlns:dgm="http://schemas.openxmlformats.org/drawingml/2006/diagram" xmlns:o="urn:schemas-microsoft-com:office:office" xmlns:v="urn:schemas-microsoft-com:vml" xmlns:pvml="urn:schemas-microsoft-com:office:powerpoint" xmlns:com="http://schemas.openxmlformats.org/drawingml/2006/compatibility" xmlns:p15="http://schemas.microsoft.com/office/powerpoint/2012/main">
+    <mc:Fallback xmlns:p15="http://schemas.microsoft.com/office/powerpoint/2012/main" xmlns:com="http://schemas.openxmlformats.org/drawingml/2006/compatibility" xmlns:pvml="urn:schemas-microsoft-com:office:powerpoint" xmlns:v="urn:schemas-microsoft-com:vml" xmlns:o="urn:schemas-microsoft-com:office:office" xmlns:dgm="http://schemas.openxmlformats.org/drawingml/2006/diagram" xmlns:c="http://schemas.openxmlformats.org/drawingml/2006/chart" xmlns:mv="urn:schemas-microsoft-com:mac:vml" xmlns="">
       <p:transition spd="slow">
         <p:fade/>
       </p:transition>
@@ -15574,7 +16014,7 @@
         <p:fade/>
       </p:transition>
     </mc:Choice>
-    <mc:Fallback xmlns="" xmlns:mv="urn:schemas-microsoft-com:mac:vml" xmlns:c="http://schemas.openxmlformats.org/drawingml/2006/chart" xmlns:dgm="http://schemas.openxmlformats.org/drawingml/2006/diagram" xmlns:o="urn:schemas-microsoft-com:office:office" xmlns:v="urn:schemas-microsoft-com:vml" xmlns:pvml="urn:schemas-microsoft-com:office:powerpoint" xmlns:com="http://schemas.openxmlformats.org/drawingml/2006/compatibility" xmlns:p15="http://schemas.microsoft.com/office/powerpoint/2012/main">
+    <mc:Fallback xmlns:p15="http://schemas.microsoft.com/office/powerpoint/2012/main" xmlns:com="http://schemas.openxmlformats.org/drawingml/2006/compatibility" xmlns:pvml="urn:schemas-microsoft-com:office:powerpoint" xmlns:v="urn:schemas-microsoft-com:vml" xmlns:o="urn:schemas-microsoft-com:office:office" xmlns:dgm="http://schemas.openxmlformats.org/drawingml/2006/diagram" xmlns:c="http://schemas.openxmlformats.org/drawingml/2006/chart" xmlns:mv="urn:schemas-microsoft-com:mac:vml" xmlns="">
       <p:transition spd="slow">
         <p:fade/>
       </p:transition>
@@ -16998,7 +17438,7 @@
         <p:fade/>
       </p:transition>
     </mc:Choice>
-    <mc:Fallback xmlns="" xmlns:mv="urn:schemas-microsoft-com:mac:vml" xmlns:c="http://schemas.openxmlformats.org/drawingml/2006/chart" xmlns:dgm="http://schemas.openxmlformats.org/drawingml/2006/diagram" xmlns:o="urn:schemas-microsoft-com:office:office" xmlns:v="urn:schemas-microsoft-com:vml" xmlns:pvml="urn:schemas-microsoft-com:office:powerpoint" xmlns:com="http://schemas.openxmlformats.org/drawingml/2006/compatibility" xmlns:p15="http://schemas.microsoft.com/office/powerpoint/2012/main">
+    <mc:Fallback xmlns:p15="http://schemas.microsoft.com/office/powerpoint/2012/main" xmlns:com="http://schemas.openxmlformats.org/drawingml/2006/compatibility" xmlns:pvml="urn:schemas-microsoft-com:office:powerpoint" xmlns:v="urn:schemas-microsoft-com:vml" xmlns:o="urn:schemas-microsoft-com:office:office" xmlns:dgm="http://schemas.openxmlformats.org/drawingml/2006/diagram" xmlns:c="http://schemas.openxmlformats.org/drawingml/2006/chart" xmlns:mv="urn:schemas-microsoft-com:mac:vml" xmlns="">
       <p:transition spd="slow">
         <p:fade/>
       </p:transition>
@@ -18113,7 +18553,7 @@
         <p:fade/>
       </p:transition>
     </mc:Choice>
-    <mc:Fallback xmlns="" xmlns:mv="urn:schemas-microsoft-com:mac:vml" xmlns:c="http://schemas.openxmlformats.org/drawingml/2006/chart" xmlns:dgm="http://schemas.openxmlformats.org/drawingml/2006/diagram" xmlns:o="urn:schemas-microsoft-com:office:office" xmlns:v="urn:schemas-microsoft-com:vml" xmlns:pvml="urn:schemas-microsoft-com:office:powerpoint" xmlns:com="http://schemas.openxmlformats.org/drawingml/2006/compatibility" xmlns:p15="http://schemas.microsoft.com/office/powerpoint/2012/main">
+    <mc:Fallback xmlns:p15="http://schemas.microsoft.com/office/powerpoint/2012/main" xmlns:com="http://schemas.openxmlformats.org/drawingml/2006/compatibility" xmlns:pvml="urn:schemas-microsoft-com:office:powerpoint" xmlns:v="urn:schemas-microsoft-com:vml" xmlns:o="urn:schemas-microsoft-com:office:office" xmlns:dgm="http://schemas.openxmlformats.org/drawingml/2006/diagram" xmlns:c="http://schemas.openxmlformats.org/drawingml/2006/chart" xmlns:mv="urn:schemas-microsoft-com:mac:vml" xmlns="">
       <p:transition spd="slow">
         <p:fade/>
       </p:transition>
@@ -19120,7 +19560,7 @@
         <p:fade/>
       </p:transition>
     </mc:Choice>
-    <mc:Fallback xmlns="" xmlns:mv="urn:schemas-microsoft-com:mac:vml" xmlns:c="http://schemas.openxmlformats.org/drawingml/2006/chart" xmlns:dgm="http://schemas.openxmlformats.org/drawingml/2006/diagram" xmlns:o="urn:schemas-microsoft-com:office:office" xmlns:v="urn:schemas-microsoft-com:vml" xmlns:pvml="urn:schemas-microsoft-com:office:powerpoint" xmlns:com="http://schemas.openxmlformats.org/drawingml/2006/compatibility" xmlns:p15="http://schemas.microsoft.com/office/powerpoint/2012/main">
+    <mc:Fallback xmlns:p15="http://schemas.microsoft.com/office/powerpoint/2012/main" xmlns:com="http://schemas.openxmlformats.org/drawingml/2006/compatibility" xmlns:pvml="urn:schemas-microsoft-com:office:powerpoint" xmlns:v="urn:schemas-microsoft-com:vml" xmlns:o="urn:schemas-microsoft-com:office:office" xmlns:dgm="http://schemas.openxmlformats.org/drawingml/2006/diagram" xmlns:c="http://schemas.openxmlformats.org/drawingml/2006/chart" xmlns:mv="urn:schemas-microsoft-com:mac:vml" xmlns="">
       <p:transition spd="slow">
         <p:fade/>
       </p:transition>
@@ -19476,7 +19916,7 @@
         <p:fade/>
       </p:transition>
     </mc:Choice>
-    <mc:Fallback xmlns="" xmlns:mv="urn:schemas-microsoft-com:mac:vml" xmlns:c="http://schemas.openxmlformats.org/drawingml/2006/chart" xmlns:dgm="http://schemas.openxmlformats.org/drawingml/2006/diagram" xmlns:o="urn:schemas-microsoft-com:office:office" xmlns:v="urn:schemas-microsoft-com:vml" xmlns:pvml="urn:schemas-microsoft-com:office:powerpoint" xmlns:com="http://schemas.openxmlformats.org/drawingml/2006/compatibility" xmlns:p15="http://schemas.microsoft.com/office/powerpoint/2012/main">
+    <mc:Fallback xmlns:p15="http://schemas.microsoft.com/office/powerpoint/2012/main" xmlns:com="http://schemas.openxmlformats.org/drawingml/2006/compatibility" xmlns:pvml="urn:schemas-microsoft-com:office:powerpoint" xmlns:v="urn:schemas-microsoft-com:vml" xmlns:o="urn:schemas-microsoft-com:office:office" xmlns:dgm="http://schemas.openxmlformats.org/drawingml/2006/diagram" xmlns:c="http://schemas.openxmlformats.org/drawingml/2006/chart" xmlns:mv="urn:schemas-microsoft-com:mac:vml" xmlns="">
       <p:transition spd="slow">
         <p:fade/>
       </p:transition>
@@ -19673,7 +20113,7 @@
         <p:fade/>
       </p:transition>
     </mc:Choice>
-    <mc:Fallback xmlns="" xmlns:mv="urn:schemas-microsoft-com:mac:vml" xmlns:c="http://schemas.openxmlformats.org/drawingml/2006/chart" xmlns:dgm="http://schemas.openxmlformats.org/drawingml/2006/diagram" xmlns:o="urn:schemas-microsoft-com:office:office" xmlns:v="urn:schemas-microsoft-com:vml" xmlns:pvml="urn:schemas-microsoft-com:office:powerpoint" xmlns:com="http://schemas.openxmlformats.org/drawingml/2006/compatibility" xmlns:p15="http://schemas.microsoft.com/office/powerpoint/2012/main">
+    <mc:Fallback xmlns:p15="http://schemas.microsoft.com/office/powerpoint/2012/main" xmlns:com="http://schemas.openxmlformats.org/drawingml/2006/compatibility" xmlns:pvml="urn:schemas-microsoft-com:office:powerpoint" xmlns:v="urn:schemas-microsoft-com:vml" xmlns:o="urn:schemas-microsoft-com:office:office" xmlns:dgm="http://schemas.openxmlformats.org/drawingml/2006/diagram" xmlns:c="http://schemas.openxmlformats.org/drawingml/2006/chart" xmlns:mv="urn:schemas-microsoft-com:mac:vml" xmlns="">
       <p:transition spd="slow">
         <p:fade/>
       </p:transition>
@@ -20018,7 +20458,7 @@
         <p:fade/>
       </p:transition>
     </mc:Choice>
-    <mc:Fallback xmlns="" xmlns:mv="urn:schemas-microsoft-com:mac:vml" xmlns:c="http://schemas.openxmlformats.org/drawingml/2006/chart" xmlns:dgm="http://schemas.openxmlformats.org/drawingml/2006/diagram" xmlns:o="urn:schemas-microsoft-com:office:office" xmlns:v="urn:schemas-microsoft-com:vml" xmlns:pvml="urn:schemas-microsoft-com:office:powerpoint" xmlns:com="http://schemas.openxmlformats.org/drawingml/2006/compatibility" xmlns:p15="http://schemas.microsoft.com/office/powerpoint/2012/main">
+    <mc:Fallback xmlns:p15="http://schemas.microsoft.com/office/powerpoint/2012/main" xmlns:com="http://schemas.openxmlformats.org/drawingml/2006/compatibility" xmlns:pvml="urn:schemas-microsoft-com:office:powerpoint" xmlns:v="urn:schemas-microsoft-com:vml" xmlns:o="urn:schemas-microsoft-com:office:office" xmlns:dgm="http://schemas.openxmlformats.org/drawingml/2006/diagram" xmlns:c="http://schemas.openxmlformats.org/drawingml/2006/chart" xmlns:mv="urn:schemas-microsoft-com:mac:vml" xmlns="">
       <p:transition spd="slow">
         <p:fade/>
       </p:transition>
@@ -20318,7 +20758,7 @@
         <p:fade/>
       </p:transition>
     </mc:Choice>
-    <mc:Fallback xmlns="" xmlns:mv="urn:schemas-microsoft-com:mac:vml" xmlns:c="http://schemas.openxmlformats.org/drawingml/2006/chart" xmlns:dgm="http://schemas.openxmlformats.org/drawingml/2006/diagram" xmlns:o="urn:schemas-microsoft-com:office:office" xmlns:v="urn:schemas-microsoft-com:vml" xmlns:pvml="urn:schemas-microsoft-com:office:powerpoint" xmlns:com="http://schemas.openxmlformats.org/drawingml/2006/compatibility" xmlns:p15="http://schemas.microsoft.com/office/powerpoint/2012/main">
+    <mc:Fallback xmlns:p15="http://schemas.microsoft.com/office/powerpoint/2012/main" xmlns:com="http://schemas.openxmlformats.org/drawingml/2006/compatibility" xmlns:pvml="urn:schemas-microsoft-com:office:powerpoint" xmlns:v="urn:schemas-microsoft-com:vml" xmlns:o="urn:schemas-microsoft-com:office:office" xmlns:dgm="http://schemas.openxmlformats.org/drawingml/2006/diagram" xmlns:c="http://schemas.openxmlformats.org/drawingml/2006/chart" xmlns:mv="urn:schemas-microsoft-com:mac:vml" xmlns="">
       <p:transition spd="slow">
         <p:fade/>
       </p:transition>
@@ -20462,7 +20902,7 @@
         <p:fade/>
       </p:transition>
     </mc:Choice>
-    <mc:Fallback xmlns="" xmlns:mv="urn:schemas-microsoft-com:mac:vml" xmlns:c="http://schemas.openxmlformats.org/drawingml/2006/chart" xmlns:dgm="http://schemas.openxmlformats.org/drawingml/2006/diagram" xmlns:o="urn:schemas-microsoft-com:office:office" xmlns:v="urn:schemas-microsoft-com:vml" xmlns:pvml="urn:schemas-microsoft-com:office:powerpoint" xmlns:com="http://schemas.openxmlformats.org/drawingml/2006/compatibility" xmlns:p15="http://schemas.microsoft.com/office/powerpoint/2012/main">
+    <mc:Fallback xmlns:p15="http://schemas.microsoft.com/office/powerpoint/2012/main" xmlns:com="http://schemas.openxmlformats.org/drawingml/2006/compatibility" xmlns:pvml="urn:schemas-microsoft-com:office:powerpoint" xmlns:v="urn:schemas-microsoft-com:vml" xmlns:o="urn:schemas-microsoft-com:office:office" xmlns:dgm="http://schemas.openxmlformats.org/drawingml/2006/diagram" xmlns:c="http://schemas.openxmlformats.org/drawingml/2006/chart" xmlns:mv="urn:schemas-microsoft-com:mac:vml" xmlns="">
       <p:transition spd="slow">
         <p:fade/>
       </p:transition>
@@ -20554,7 +20994,7 @@
   <p:cSld>
     <p:spTree>
       <p:nvGrpSpPr>
-        <p:cNvPr id="1" name="Shape 197"/>
+        <p:cNvPr id="1" name="Shape 179"/>
         <p:cNvGrpSpPr/>
         <p:nvPr/>
       </p:nvGrpSpPr>
@@ -20568,7 +21008,186 @@
       </p:grpSpPr>
       <p:sp>
         <p:nvSpPr>
-          <p:cNvPr id="198" name="Google Shape;198;p28"/>
+          <p:cNvPr id="180" name="Google Shape;180;p25"/>
+          <p:cNvSpPr txBox="1">
+            <a:spLocks noGrp="1"/>
+          </p:cNvSpPr>
+          <p:nvPr>
+            <p:ph type="body" idx="1"/>
+          </p:nvPr>
+        </p:nvSpPr>
+        <p:spPr>
+          <a:xfrm>
+            <a:off x="1451579" y="1853619"/>
+            <a:ext cx="9603300" cy="3450600"/>
+          </a:xfrm>
+          <a:prstGeom prst="rect">
+            <a:avLst/>
+          </a:prstGeom>
+          <a:noFill/>
+          <a:ln>
+            <a:noFill/>
+          </a:ln>
+        </p:spPr>
+        <p:txBody>
+          <a:bodyPr spcFirstLastPara="1" wrap="square" lIns="91425" tIns="45700" rIns="91425" bIns="45700" anchor="t" anchorCtr="0">
+            <a:noAutofit/>
+          </a:bodyPr>
+          <a:lstStyle/>
+          <a:p>
+            <a:pPr marL="228600" lvl="0" indent="0" algn="l" rtl="0">
+              <a:lnSpc>
+                <a:spcPct val="120000"/>
+              </a:lnSpc>
+              <a:spcBef>
+                <a:spcPts val="0"/>
+              </a:spcBef>
+              <a:spcAft>
+                <a:spcPts val="0"/>
+              </a:spcAft>
+              <a:buNone/>
+            </a:pPr>
+            <a:r>
+              <a:rPr lang="en-US" dirty="0">
+                <a:latin typeface="Times New Roman"/>
+                <a:ea typeface="Times New Roman"/>
+                <a:cs typeface="Times New Roman"/>
+                <a:sym typeface="Times New Roman"/>
+              </a:rPr>
+              <a:t>2.1 </a:t>
+            </a:r>
+            <a:r>
+              <a:rPr lang="en-US" dirty="0" err="1">
+                <a:latin typeface="Times New Roman"/>
+                <a:ea typeface="Times New Roman"/>
+                <a:cs typeface="Times New Roman"/>
+                <a:sym typeface="Times New Roman"/>
+              </a:rPr>
+              <a:t>Biểu</a:t>
+            </a:r>
+            <a:r>
+              <a:rPr lang="en-US" dirty="0">
+                <a:latin typeface="Times New Roman"/>
+                <a:ea typeface="Times New Roman"/>
+                <a:cs typeface="Times New Roman"/>
+                <a:sym typeface="Times New Roman"/>
+              </a:rPr>
+              <a:t> </a:t>
+            </a:r>
+            <a:r>
+              <a:rPr lang="en-US" dirty="0" err="1">
+                <a:latin typeface="Times New Roman"/>
+                <a:ea typeface="Times New Roman"/>
+                <a:cs typeface="Times New Roman"/>
+                <a:sym typeface="Times New Roman"/>
+              </a:rPr>
+              <a:t>đồ</a:t>
+            </a:r>
+            <a:r>
+              <a:rPr lang="en-US" dirty="0">
+                <a:latin typeface="Times New Roman"/>
+                <a:ea typeface="Times New Roman"/>
+                <a:cs typeface="Times New Roman"/>
+                <a:sym typeface="Times New Roman"/>
+              </a:rPr>
+              <a:t> </a:t>
+            </a:r>
+            <a:r>
+              <a:rPr lang="en-US" dirty="0" err="1">
+                <a:latin typeface="Times New Roman"/>
+                <a:ea typeface="Times New Roman"/>
+                <a:cs typeface="Times New Roman"/>
+                <a:sym typeface="Times New Roman"/>
+              </a:rPr>
+              <a:t>lớp</a:t>
+            </a:r>
+            <a:r>
+              <a:rPr lang="en-US" dirty="0">
+                <a:latin typeface="Times New Roman"/>
+                <a:ea typeface="Times New Roman"/>
+                <a:cs typeface="Times New Roman"/>
+                <a:sym typeface="Times New Roman"/>
+              </a:rPr>
+              <a:t> </a:t>
+            </a:r>
+            <a:r>
+              <a:rPr lang="en-US" dirty="0" err="1">
+                <a:latin typeface="Times New Roman"/>
+                <a:ea typeface="Times New Roman"/>
+                <a:cs typeface="Times New Roman"/>
+                <a:sym typeface="Times New Roman"/>
+              </a:rPr>
+              <a:t>lập</a:t>
+            </a:r>
+            <a:r>
+              <a:rPr lang="en-US" dirty="0">
+                <a:latin typeface="Times New Roman"/>
+                <a:ea typeface="Times New Roman"/>
+                <a:cs typeface="Times New Roman"/>
+                <a:sym typeface="Times New Roman"/>
+              </a:rPr>
+              <a:t> </a:t>
+            </a:r>
+            <a:r>
+              <a:rPr lang="en-US" dirty="0" err="1">
+                <a:latin typeface="Times New Roman"/>
+                <a:ea typeface="Times New Roman"/>
+                <a:cs typeface="Times New Roman"/>
+                <a:sym typeface="Times New Roman"/>
+              </a:rPr>
+              <a:t>hóa</a:t>
+            </a:r>
+            <a:r>
+              <a:rPr lang="en-US" dirty="0">
+                <a:latin typeface="Times New Roman"/>
+                <a:ea typeface="Times New Roman"/>
+                <a:cs typeface="Times New Roman"/>
+                <a:sym typeface="Times New Roman"/>
+              </a:rPr>
+              <a:t> </a:t>
+            </a:r>
+            <a:r>
+              <a:rPr lang="en-US" dirty="0" err="1">
+                <a:latin typeface="Times New Roman"/>
+                <a:ea typeface="Times New Roman"/>
+                <a:cs typeface="Times New Roman"/>
+                <a:sym typeface="Times New Roman"/>
+              </a:rPr>
+              <a:t>đơn</a:t>
+            </a:r>
+            <a:endParaRPr dirty="0">
+              <a:latin typeface="Times New Roman"/>
+              <a:ea typeface="Times New Roman"/>
+              <a:cs typeface="Times New Roman"/>
+              <a:sym typeface="Times New Roman"/>
+            </a:endParaRPr>
+          </a:p>
+          <a:p>
+            <a:pPr marL="228600" lvl="0" indent="-101600" algn="l" rtl="0">
+              <a:lnSpc>
+                <a:spcPct val="120000"/>
+              </a:lnSpc>
+              <a:spcBef>
+                <a:spcPts val="1000"/>
+              </a:spcBef>
+              <a:spcAft>
+                <a:spcPts val="0"/>
+              </a:spcAft>
+              <a:buSzPts val="2000"/>
+              <a:buNone/>
+            </a:pPr>
+            <a:endParaRPr dirty="0">
+              <a:latin typeface="Times New Roman"/>
+              <a:ea typeface="Times New Roman"/>
+              <a:cs typeface="Times New Roman"/>
+              <a:sym typeface="Times New Roman"/>
+            </a:endParaRPr>
+          </a:p>
+        </p:txBody>
+      </p:sp>
+      <p:sp>
+        <p:nvSpPr>
+          <p:cNvPr id="181" name="Google Shape;181;p25"/>
           <p:cNvSpPr txBox="1">
             <a:spLocks noGrp="1"/>
           </p:cNvSpPr>
@@ -20579,7 +21198,7 @@
         <p:spPr>
           <a:xfrm>
             <a:off x="1451579" y="804519"/>
-            <a:ext cx="9603275" cy="1049235"/>
+            <a:ext cx="9603300" cy="1049100"/>
           </a:xfrm>
           <a:prstGeom prst="rect">
             <a:avLst/>
@@ -20613,86 +21232,54 @@
               <a:buNone/>
             </a:pPr>
             <a:r>
-              <a:rPr lang="en-US">
-                <a:latin typeface="Times New Roman"/>
-                <a:ea typeface="Times New Roman"/>
-                <a:cs typeface="Times New Roman"/>
-                <a:sym typeface="Times New Roman"/>
-              </a:rPr>
-              <a:t>TÀI LIỆU THAM KHẢO</a:t>
-            </a:r>
-            <a:endParaRPr>
-              <a:latin typeface="Times New Roman"/>
-              <a:ea typeface="Times New Roman"/>
-              <a:cs typeface="Times New Roman"/>
-              <a:sym typeface="Times New Roman"/>
-            </a:endParaRPr>
+              <a:rPr lang="en-US" dirty="0">
+                <a:latin typeface="Times New Roman"/>
+                <a:ea typeface="Times New Roman"/>
+                <a:cs typeface="Times New Roman"/>
+                <a:sym typeface="Times New Roman"/>
+              </a:rPr>
+              <a:t>III- BIỂU ĐỒ</a:t>
+            </a:r>
+            <a:endParaRPr dirty="0"/>
           </a:p>
         </p:txBody>
       </p:sp>
-      <p:sp>
-        <p:nvSpPr>
-          <p:cNvPr id="199" name="Google Shape;199;p28"/>
-          <p:cNvSpPr txBox="1">
-            <a:spLocks noGrp="1"/>
-          </p:cNvSpPr>
-          <p:nvPr>
-            <p:ph type="body" idx="1"/>
-          </p:nvPr>
-        </p:nvSpPr>
+      <p:pic>
+        <p:nvPicPr>
+          <p:cNvPr id="3" name="Picture 2">
+            <a:extLst>
+              <a:ext uri="{FF2B5EF4-FFF2-40B4-BE49-F238E27FC236}">
+                <a16:creationId xmlns:a16="http://schemas.microsoft.com/office/drawing/2014/main" id="{AE9A5085-4ED4-42A6-801F-DBC9CF85BB91}"/>
+              </a:ext>
+            </a:extLst>
+          </p:cNvPr>
+          <p:cNvPicPr>
+            <a:picLocks noChangeAspect="1"/>
+          </p:cNvPicPr>
+          <p:nvPr/>
+        </p:nvPicPr>
+        <p:blipFill>
+          <a:blip r:embed="rId3"/>
+          <a:stretch>
+            <a:fillRect/>
+          </a:stretch>
+        </p:blipFill>
         <p:spPr>
           <a:xfrm>
-            <a:off x="1451579" y="2015732"/>
-            <a:ext cx="9603275" cy="3450613"/>
+            <a:off x="2290689" y="2508693"/>
+            <a:ext cx="8257735" cy="4160385"/>
           </a:xfrm>
           <a:prstGeom prst="rect">
             <a:avLst/>
           </a:prstGeom>
-          <a:noFill/>
-          <a:ln>
-            <a:noFill/>
-          </a:ln>
         </p:spPr>
-        <p:txBody>
-          <a:bodyPr spcFirstLastPara="1" wrap="square" lIns="91425" tIns="45700" rIns="91425" bIns="45700" anchor="t" anchorCtr="0">
-            <a:noAutofit/>
-          </a:bodyPr>
-          <a:lstStyle/>
-          <a:p>
-            <a:pPr marL="228600" lvl="0" indent="-228600" algn="l" rtl="0">
-              <a:lnSpc>
-                <a:spcPct val="120000"/>
-              </a:lnSpc>
-              <a:spcBef>
-                <a:spcPts val="0"/>
-              </a:spcBef>
-              <a:spcAft>
-                <a:spcPts val="0"/>
-              </a:spcAft>
-              <a:buSzPts val="2000"/>
-              <a:buChar char="•"/>
-            </a:pPr>
-            <a:endParaRPr dirty="0"/>
-          </a:p>
-          <a:p>
-            <a:pPr marL="228600" lvl="0" indent="-228600" algn="l" rtl="0">
-              <a:lnSpc>
-                <a:spcPct val="120000"/>
-              </a:lnSpc>
-              <a:spcBef>
-                <a:spcPts val="1000"/>
-              </a:spcBef>
-              <a:spcAft>
-                <a:spcPts val="0"/>
-              </a:spcAft>
-              <a:buSzPts val="2000"/>
-              <a:buChar char="•"/>
-            </a:pPr>
-            <a:endParaRPr dirty="0"/>
-          </a:p>
-        </p:txBody>
-      </p:sp>
+      </p:pic>
     </p:spTree>
+    <p:extLst>
+      <p:ext uri="{BB962C8B-B14F-4D97-AF65-F5344CB8AC3E}">
+        <p14:creationId xmlns:p14="http://schemas.microsoft.com/office/powerpoint/2010/main" val="2053631709"/>
+      </p:ext>
+    </p:extLst>
   </p:cSld>
   <p:clrMapOvr>
     <a:masterClrMapping/>
@@ -20703,7 +21290,7 @@
         <p:fade/>
       </p:transition>
     </mc:Choice>
-    <mc:Fallback xmlns="" xmlns:mv="urn:schemas-microsoft-com:mac:vml" xmlns:c="http://schemas.openxmlformats.org/drawingml/2006/chart" xmlns:dgm="http://schemas.openxmlformats.org/drawingml/2006/diagram" xmlns:o="urn:schemas-microsoft-com:office:office" xmlns:v="urn:schemas-microsoft-com:vml" xmlns:pvml="urn:schemas-microsoft-com:office:powerpoint" xmlns:com="http://schemas.openxmlformats.org/drawingml/2006/compatibility" xmlns:p15="http://schemas.microsoft.com/office/powerpoint/2012/main">
+    <mc:Fallback xmlns:p15="http://schemas.microsoft.com/office/powerpoint/2012/main" xmlns:com="http://schemas.openxmlformats.org/drawingml/2006/compatibility" xmlns:pvml="urn:schemas-microsoft-com:office:powerpoint" xmlns:v="urn:schemas-microsoft-com:vml" xmlns:o="urn:schemas-microsoft-com:office:office" xmlns:dgm="http://schemas.openxmlformats.org/drawingml/2006/diagram" xmlns:c="http://schemas.openxmlformats.org/drawingml/2006/chart" xmlns:mv="urn:schemas-microsoft-com:mac:vml" xmlns="">
       <p:transition spd="slow">
         <p:fade/>
       </p:transition>
@@ -20743,57 +21330,7 @@
                                           </p:stCondLst>
                                         </p:cTn>
                                         <p:tgtEl>
-                                          <p:spTgt spid="198"/>
-                                        </p:tgtEl>
-                                        <p:attrNameLst>
-                                          <p:attrName>style.visibility</p:attrName>
-                                        </p:attrNameLst>
-                                      </p:cBhvr>
-                                      <p:to>
-                                        <p:strVal val="visible"/>
-                                      </p:to>
-                                    </p:set>
-                                  </p:childTnLst>
-                                </p:cTn>
-                              </p:par>
-                            </p:childTnLst>
-                          </p:cTn>
-                        </p:par>
-                      </p:childTnLst>
-                    </p:cTn>
-                  </p:par>
-                  <p:par>
-                    <p:cTn id="7" fill="hold">
-                      <p:stCondLst>
-                        <p:cond delay="indefinite"/>
-                      </p:stCondLst>
-                      <p:childTnLst>
-                        <p:par>
-                          <p:cTn id="8" fill="hold">
-                            <p:stCondLst>
-                              <p:cond delay="0"/>
-                            </p:stCondLst>
-                            <p:childTnLst>
-                              <p:par>
-                                <p:cTn id="9" presetID="1" presetClass="entr" presetSubtype="0" fill="hold" nodeType="clickEffect" nodePh="1">
-                                  <p:stCondLst>
-                                    <p:cond delay="0"/>
-                                  </p:stCondLst>
-                                  <p:endCondLst>
-                                    <p:cond evt="begin" delay="0">
-                                      <p:tn val="9"/>
-                                    </p:cond>
-                                  </p:endCondLst>
-                                  <p:childTnLst>
-                                    <p:set>
-                                      <p:cBhvr>
-                                        <p:cTn id="10" dur="1" fill="hold">
-                                          <p:stCondLst>
-                                            <p:cond delay="0"/>
-                                          </p:stCondLst>
-                                        </p:cTn>
-                                        <p:tgtEl>
-                                          <p:spTgt spid="199">
+                                          <p:spTgt spid="180">
                                             <p:txEl>
                                               <p:pRg st="0" end="0"/>
                                             </p:txEl>
@@ -21089,7 +21626,7 @@
         <p:fade thruBlk="1"/>
       </p:transition>
     </mc:Choice>
-    <mc:Fallback xmlns="" xmlns:mv="urn:schemas-microsoft-com:mac:vml" xmlns:c="http://schemas.openxmlformats.org/drawingml/2006/chart" xmlns:dgm="http://schemas.openxmlformats.org/drawingml/2006/diagram" xmlns:o="urn:schemas-microsoft-com:office:office" xmlns:v="urn:schemas-microsoft-com:vml" xmlns:pvml="urn:schemas-microsoft-com:office:powerpoint" xmlns:com="http://schemas.openxmlformats.org/drawingml/2006/compatibility" xmlns:p15="http://schemas.microsoft.com/office/powerpoint/2012/main">
+    <mc:Fallback xmlns:p15="http://schemas.microsoft.com/office/powerpoint/2012/main" xmlns:com="http://schemas.openxmlformats.org/drawingml/2006/compatibility" xmlns:pvml="urn:schemas-microsoft-com:office:powerpoint" xmlns:v="urn:schemas-microsoft-com:vml" xmlns:o="urn:schemas-microsoft-com:office:office" xmlns:dgm="http://schemas.openxmlformats.org/drawingml/2006/diagram" xmlns:c="http://schemas.openxmlformats.org/drawingml/2006/chart" xmlns:mv="urn:schemas-microsoft-com:mac:vml" xmlns="">
       <p:transition spd="slow">
         <p:fade/>
       </p:transition>
@@ -21320,6 +21857,1357 @@
   <p:cSld>
     <p:spTree>
       <p:nvGrpSpPr>
+        <p:cNvPr id="1" name="Shape 179"/>
+        <p:cNvGrpSpPr/>
+        <p:nvPr/>
+      </p:nvGrpSpPr>
+      <p:grpSpPr>
+        <a:xfrm>
+          <a:off x="0" y="0"/>
+          <a:ext cx="0" cy="0"/>
+          <a:chOff x="0" y="0"/>
+          <a:chExt cx="0" cy="0"/>
+        </a:xfrm>
+      </p:grpSpPr>
+      <p:sp>
+        <p:nvSpPr>
+          <p:cNvPr id="180" name="Google Shape;180;p25"/>
+          <p:cNvSpPr txBox="1">
+            <a:spLocks noGrp="1"/>
+          </p:cNvSpPr>
+          <p:nvPr>
+            <p:ph type="body" idx="1"/>
+          </p:nvPr>
+        </p:nvSpPr>
+        <p:spPr>
+          <a:xfrm>
+            <a:off x="1451579" y="1853619"/>
+            <a:ext cx="9603300" cy="3450600"/>
+          </a:xfrm>
+          <a:prstGeom prst="rect">
+            <a:avLst/>
+          </a:prstGeom>
+          <a:noFill/>
+          <a:ln>
+            <a:noFill/>
+          </a:ln>
+        </p:spPr>
+        <p:txBody>
+          <a:bodyPr spcFirstLastPara="1" wrap="square" lIns="91425" tIns="45700" rIns="91425" bIns="45700" anchor="t" anchorCtr="0">
+            <a:noAutofit/>
+          </a:bodyPr>
+          <a:lstStyle/>
+          <a:p>
+            <a:pPr marL="228600" lvl="0" indent="0" algn="l" rtl="0">
+              <a:lnSpc>
+                <a:spcPct val="120000"/>
+              </a:lnSpc>
+              <a:spcBef>
+                <a:spcPts val="0"/>
+              </a:spcBef>
+              <a:spcAft>
+                <a:spcPts val="0"/>
+              </a:spcAft>
+              <a:buNone/>
+            </a:pPr>
+            <a:r>
+              <a:rPr lang="en-US" dirty="0">
+                <a:latin typeface="Times New Roman"/>
+                <a:ea typeface="Times New Roman"/>
+                <a:cs typeface="Times New Roman"/>
+                <a:sym typeface="Times New Roman"/>
+              </a:rPr>
+              <a:t>2.1 </a:t>
+            </a:r>
+            <a:r>
+              <a:rPr lang="en-US" dirty="0" err="1">
+                <a:latin typeface="Times New Roman"/>
+                <a:ea typeface="Times New Roman"/>
+                <a:cs typeface="Times New Roman"/>
+                <a:sym typeface="Times New Roman"/>
+              </a:rPr>
+              <a:t>Biểu</a:t>
+            </a:r>
+            <a:r>
+              <a:rPr lang="en-US" dirty="0">
+                <a:latin typeface="Times New Roman"/>
+                <a:ea typeface="Times New Roman"/>
+                <a:cs typeface="Times New Roman"/>
+                <a:sym typeface="Times New Roman"/>
+              </a:rPr>
+              <a:t> </a:t>
+            </a:r>
+            <a:r>
+              <a:rPr lang="en-US" dirty="0" err="1">
+                <a:latin typeface="Times New Roman"/>
+                <a:ea typeface="Times New Roman"/>
+                <a:cs typeface="Times New Roman"/>
+                <a:sym typeface="Times New Roman"/>
+              </a:rPr>
+              <a:t>đồ</a:t>
+            </a:r>
+            <a:r>
+              <a:rPr lang="en-US" dirty="0">
+                <a:latin typeface="Times New Roman"/>
+                <a:ea typeface="Times New Roman"/>
+                <a:cs typeface="Times New Roman"/>
+                <a:sym typeface="Times New Roman"/>
+              </a:rPr>
+              <a:t> </a:t>
+            </a:r>
+            <a:r>
+              <a:rPr lang="en-US" dirty="0" err="1">
+                <a:latin typeface="Times New Roman"/>
+                <a:ea typeface="Times New Roman"/>
+                <a:cs typeface="Times New Roman"/>
+                <a:sym typeface="Times New Roman"/>
+              </a:rPr>
+              <a:t>lớp</a:t>
+            </a:r>
+            <a:r>
+              <a:rPr lang="en-US" dirty="0">
+                <a:latin typeface="Times New Roman"/>
+                <a:ea typeface="Times New Roman"/>
+                <a:cs typeface="Times New Roman"/>
+                <a:sym typeface="Times New Roman"/>
+              </a:rPr>
+              <a:t> </a:t>
+            </a:r>
+            <a:r>
+              <a:rPr lang="en-US" dirty="0" err="1">
+                <a:latin typeface="Times New Roman"/>
+                <a:ea typeface="Times New Roman"/>
+                <a:cs typeface="Times New Roman"/>
+                <a:sym typeface="Times New Roman"/>
+              </a:rPr>
+              <a:t>trả</a:t>
+            </a:r>
+            <a:r>
+              <a:rPr lang="en-US" dirty="0">
+                <a:latin typeface="Times New Roman"/>
+                <a:ea typeface="Times New Roman"/>
+                <a:cs typeface="Times New Roman"/>
+                <a:sym typeface="Times New Roman"/>
+              </a:rPr>
+              <a:t> </a:t>
+            </a:r>
+            <a:r>
+              <a:rPr lang="en-US" dirty="0" err="1">
+                <a:latin typeface="Times New Roman"/>
+                <a:ea typeface="Times New Roman"/>
+                <a:cs typeface="Times New Roman"/>
+                <a:sym typeface="Times New Roman"/>
+              </a:rPr>
+              <a:t>hàng</a:t>
+            </a:r>
+            <a:endParaRPr dirty="0">
+              <a:latin typeface="Times New Roman"/>
+              <a:ea typeface="Times New Roman"/>
+              <a:cs typeface="Times New Roman"/>
+              <a:sym typeface="Times New Roman"/>
+            </a:endParaRPr>
+          </a:p>
+        </p:txBody>
+      </p:sp>
+      <p:sp>
+        <p:nvSpPr>
+          <p:cNvPr id="181" name="Google Shape;181;p25"/>
+          <p:cNvSpPr txBox="1">
+            <a:spLocks noGrp="1"/>
+          </p:cNvSpPr>
+          <p:nvPr>
+            <p:ph type="title"/>
+          </p:nvPr>
+        </p:nvSpPr>
+        <p:spPr>
+          <a:xfrm>
+            <a:off x="1451579" y="804519"/>
+            <a:ext cx="9603300" cy="1049100"/>
+          </a:xfrm>
+          <a:prstGeom prst="rect">
+            <a:avLst/>
+          </a:prstGeom>
+          <a:noFill/>
+          <a:ln>
+            <a:noFill/>
+          </a:ln>
+        </p:spPr>
+        <p:txBody>
+          <a:bodyPr spcFirstLastPara="1" wrap="square" lIns="91425" tIns="45700" rIns="91425" bIns="45700" anchor="t" anchorCtr="0">
+            <a:noAutofit/>
+          </a:bodyPr>
+          <a:lstStyle/>
+          <a:p>
+            <a:pPr marL="0" lvl="0" indent="0" algn="l" rtl="0">
+              <a:lnSpc>
+                <a:spcPct val="90000"/>
+              </a:lnSpc>
+              <a:spcBef>
+                <a:spcPts val="0"/>
+              </a:spcBef>
+              <a:spcAft>
+                <a:spcPts val="0"/>
+              </a:spcAft>
+              <a:buClr>
+                <a:schemeClr val="dk1"/>
+              </a:buClr>
+              <a:buSzPts val="3200"/>
+              <a:buFont typeface="Times New Roman"/>
+              <a:buNone/>
+            </a:pPr>
+            <a:r>
+              <a:rPr lang="en-US" dirty="0">
+                <a:latin typeface="Times New Roman"/>
+                <a:ea typeface="Times New Roman"/>
+                <a:cs typeface="Times New Roman"/>
+                <a:sym typeface="Times New Roman"/>
+              </a:rPr>
+              <a:t>III- BIỂU ĐỒ</a:t>
+            </a:r>
+            <a:endParaRPr dirty="0"/>
+          </a:p>
+        </p:txBody>
+      </p:sp>
+      <p:pic>
+        <p:nvPicPr>
+          <p:cNvPr id="4" name="Picture 3">
+            <a:extLst>
+              <a:ext uri="{FF2B5EF4-FFF2-40B4-BE49-F238E27FC236}">
+                <a16:creationId xmlns:a16="http://schemas.microsoft.com/office/drawing/2014/main" id="{4B56D73B-41F8-48EA-8DA4-B9C40CDCD558}"/>
+              </a:ext>
+            </a:extLst>
+          </p:cNvPr>
+          <p:cNvPicPr>
+            <a:picLocks noChangeAspect="1"/>
+          </p:cNvPicPr>
+          <p:nvPr/>
+        </p:nvPicPr>
+        <p:blipFill>
+          <a:blip r:embed="rId3"/>
+          <a:stretch>
+            <a:fillRect/>
+          </a:stretch>
+        </p:blipFill>
+        <p:spPr>
+          <a:xfrm>
+            <a:off x="2030437" y="2481830"/>
+            <a:ext cx="8131126" cy="4009138"/>
+          </a:xfrm>
+          <a:prstGeom prst="rect">
+            <a:avLst/>
+          </a:prstGeom>
+        </p:spPr>
+      </p:pic>
+    </p:spTree>
+    <p:extLst>
+      <p:ext uri="{BB962C8B-B14F-4D97-AF65-F5344CB8AC3E}">
+        <p14:creationId xmlns:p14="http://schemas.microsoft.com/office/powerpoint/2010/main" val="240931637"/>
+      </p:ext>
+    </p:extLst>
+  </p:cSld>
+  <p:clrMapOvr>
+    <a:masterClrMapping/>
+  </p:clrMapOvr>
+  <mc:AlternateContent xmlns:mc="http://schemas.openxmlformats.org/markup-compatibility/2006" xmlns:p14="http://schemas.microsoft.com/office/powerpoint/2010/main">
+    <mc:Choice Requires="p14">
+      <p:transition spd="med" p14:dur="700">
+        <p:fade/>
+      </p:transition>
+    </mc:Choice>
+    <mc:Fallback xmlns:p15="http://schemas.microsoft.com/office/powerpoint/2012/main" xmlns:com="http://schemas.openxmlformats.org/drawingml/2006/compatibility" xmlns:pvml="urn:schemas-microsoft-com:office:powerpoint" xmlns:v="urn:schemas-microsoft-com:vml" xmlns:o="urn:schemas-microsoft-com:office:office" xmlns:dgm="http://schemas.openxmlformats.org/drawingml/2006/diagram" xmlns:c="http://schemas.openxmlformats.org/drawingml/2006/chart" xmlns:mv="urn:schemas-microsoft-com:mac:vml" xmlns="">
+      <p:transition spd="slow">
+        <p:fade/>
+      </p:transition>
+    </mc:Fallback>
+  </mc:AlternateContent>
+  <p:timing>
+    <p:tnLst>
+      <p:par>
+        <p:cTn id="1" dur="indefinite" restart="never" nodeType="tmRoot">
+          <p:childTnLst>
+            <p:seq concurrent="1" nextAc="seek">
+              <p:cTn id="2" dur="indefinite" nodeType="mainSeq">
+                <p:childTnLst>
+                  <p:par>
+                    <p:cTn id="3" fill="hold">
+                      <p:stCondLst>
+                        <p:cond delay="indefinite"/>
+                      </p:stCondLst>
+                      <p:childTnLst>
+                        <p:par>
+                          <p:cTn id="4" fill="hold">
+                            <p:stCondLst>
+                              <p:cond delay="0"/>
+                            </p:stCondLst>
+                            <p:childTnLst>
+                              <p:par>
+                                <p:cTn id="5" presetID="1" presetClass="entr" presetSubtype="0" fill="hold" nodeType="clickEffect">
+                                  <p:stCondLst>
+                                    <p:cond delay="0"/>
+                                  </p:stCondLst>
+                                  <p:childTnLst>
+                                    <p:set>
+                                      <p:cBhvr>
+                                        <p:cTn id="6" dur="1" fill="hold">
+                                          <p:stCondLst>
+                                            <p:cond delay="0"/>
+                                          </p:stCondLst>
+                                        </p:cTn>
+                                        <p:tgtEl>
+                                          <p:spTgt spid="180">
+                                            <p:txEl>
+                                              <p:pRg st="0" end="0"/>
+                                            </p:txEl>
+                                          </p:spTgt>
+                                        </p:tgtEl>
+                                        <p:attrNameLst>
+                                          <p:attrName>style.visibility</p:attrName>
+                                        </p:attrNameLst>
+                                      </p:cBhvr>
+                                      <p:to>
+                                        <p:strVal val="visible"/>
+                                      </p:to>
+                                    </p:set>
+                                  </p:childTnLst>
+                                </p:cTn>
+                              </p:par>
+                            </p:childTnLst>
+                          </p:cTn>
+                        </p:par>
+                      </p:childTnLst>
+                    </p:cTn>
+                  </p:par>
+                </p:childTnLst>
+              </p:cTn>
+              <p:prevCondLst>
+                <p:cond evt="onPrev" delay="0">
+                  <p:tgtEl>
+                    <p:sldTgt/>
+                  </p:tgtEl>
+                </p:cond>
+              </p:prevCondLst>
+              <p:nextCondLst>
+                <p:cond evt="onNext" delay="0">
+                  <p:tgtEl>
+                    <p:sldTgt/>
+                  </p:tgtEl>
+                </p:cond>
+              </p:nextCondLst>
+            </p:seq>
+          </p:childTnLst>
+        </p:cTn>
+      </p:par>
+    </p:tnLst>
+  </p:timing>
+</p:sld>
+</file>
+
+<file path=ppt/slides/slide21.xml><?xml version="1.0" encoding="utf-8"?>
+<p:sld xmlns:a="http://schemas.openxmlformats.org/drawingml/2006/main" xmlns:r="http://schemas.openxmlformats.org/officeDocument/2006/relationships" xmlns:p="http://schemas.openxmlformats.org/presentationml/2006/main">
+  <p:cSld>
+    <p:spTree>
+      <p:nvGrpSpPr>
+        <p:cNvPr id="1" name="Shape 179"/>
+        <p:cNvGrpSpPr/>
+        <p:nvPr/>
+      </p:nvGrpSpPr>
+      <p:grpSpPr>
+        <a:xfrm>
+          <a:off x="0" y="0"/>
+          <a:ext cx="0" cy="0"/>
+          <a:chOff x="0" y="0"/>
+          <a:chExt cx="0" cy="0"/>
+        </a:xfrm>
+      </p:grpSpPr>
+      <p:sp>
+        <p:nvSpPr>
+          <p:cNvPr id="180" name="Google Shape;180;p25"/>
+          <p:cNvSpPr txBox="1">
+            <a:spLocks noGrp="1"/>
+          </p:cNvSpPr>
+          <p:nvPr>
+            <p:ph type="body" idx="1"/>
+          </p:nvPr>
+        </p:nvSpPr>
+        <p:spPr>
+          <a:xfrm>
+            <a:off x="1451579" y="1853619"/>
+            <a:ext cx="9603300" cy="3450600"/>
+          </a:xfrm>
+          <a:prstGeom prst="rect">
+            <a:avLst/>
+          </a:prstGeom>
+          <a:noFill/>
+          <a:ln>
+            <a:noFill/>
+          </a:ln>
+        </p:spPr>
+        <p:txBody>
+          <a:bodyPr spcFirstLastPara="1" wrap="square" lIns="91425" tIns="45700" rIns="91425" bIns="45700" anchor="t" anchorCtr="0">
+            <a:noAutofit/>
+          </a:bodyPr>
+          <a:lstStyle/>
+          <a:p>
+            <a:pPr marL="228600" lvl="0" indent="0" algn="l" rtl="0">
+              <a:lnSpc>
+                <a:spcPct val="120000"/>
+              </a:lnSpc>
+              <a:spcBef>
+                <a:spcPts val="0"/>
+              </a:spcBef>
+              <a:spcAft>
+                <a:spcPts val="0"/>
+              </a:spcAft>
+              <a:buNone/>
+            </a:pPr>
+            <a:r>
+              <a:rPr lang="en-US" dirty="0">
+                <a:latin typeface="Times New Roman"/>
+                <a:ea typeface="Times New Roman"/>
+                <a:cs typeface="Times New Roman"/>
+                <a:sym typeface="Times New Roman"/>
+              </a:rPr>
+              <a:t>2.1 </a:t>
+            </a:r>
+            <a:r>
+              <a:rPr lang="en-US" dirty="0" err="1">
+                <a:latin typeface="Times New Roman"/>
+                <a:ea typeface="Times New Roman"/>
+                <a:cs typeface="Times New Roman"/>
+                <a:sym typeface="Times New Roman"/>
+              </a:rPr>
+              <a:t>Biểu</a:t>
+            </a:r>
+            <a:r>
+              <a:rPr lang="en-US" dirty="0">
+                <a:latin typeface="Times New Roman"/>
+                <a:ea typeface="Times New Roman"/>
+                <a:cs typeface="Times New Roman"/>
+                <a:sym typeface="Times New Roman"/>
+              </a:rPr>
+              <a:t> </a:t>
+            </a:r>
+            <a:r>
+              <a:rPr lang="en-US" dirty="0" err="1">
+                <a:latin typeface="Times New Roman"/>
+                <a:ea typeface="Times New Roman"/>
+                <a:cs typeface="Times New Roman"/>
+                <a:sym typeface="Times New Roman"/>
+              </a:rPr>
+              <a:t>đồ</a:t>
+            </a:r>
+            <a:r>
+              <a:rPr lang="en-US" dirty="0">
+                <a:latin typeface="Times New Roman"/>
+                <a:ea typeface="Times New Roman"/>
+                <a:cs typeface="Times New Roman"/>
+                <a:sym typeface="Times New Roman"/>
+              </a:rPr>
+              <a:t> </a:t>
+            </a:r>
+            <a:r>
+              <a:rPr lang="en-US" dirty="0" err="1">
+                <a:latin typeface="Times New Roman"/>
+                <a:ea typeface="Times New Roman"/>
+                <a:cs typeface="Times New Roman"/>
+                <a:sym typeface="Times New Roman"/>
+              </a:rPr>
+              <a:t>lớp</a:t>
+            </a:r>
+            <a:r>
+              <a:rPr lang="en-US" dirty="0">
+                <a:latin typeface="Times New Roman"/>
+                <a:ea typeface="Times New Roman"/>
+                <a:cs typeface="Times New Roman"/>
+                <a:sym typeface="Times New Roman"/>
+              </a:rPr>
+              <a:t> </a:t>
+            </a:r>
+            <a:r>
+              <a:rPr lang="en-US" dirty="0" err="1">
+                <a:latin typeface="Times New Roman"/>
+                <a:ea typeface="Times New Roman"/>
+                <a:cs typeface="Times New Roman"/>
+                <a:sym typeface="Times New Roman"/>
+              </a:rPr>
+              <a:t>nhập</a:t>
+            </a:r>
+            <a:r>
+              <a:rPr lang="en-US" dirty="0">
+                <a:latin typeface="Times New Roman"/>
+                <a:ea typeface="Times New Roman"/>
+                <a:cs typeface="Times New Roman"/>
+                <a:sym typeface="Times New Roman"/>
+              </a:rPr>
+              <a:t> </a:t>
+            </a:r>
+            <a:r>
+              <a:rPr lang="en-US" dirty="0" err="1">
+                <a:latin typeface="Times New Roman"/>
+                <a:ea typeface="Times New Roman"/>
+                <a:cs typeface="Times New Roman"/>
+                <a:sym typeface="Times New Roman"/>
+              </a:rPr>
+              <a:t>hàng</a:t>
+            </a:r>
+            <a:endParaRPr dirty="0">
+              <a:latin typeface="Times New Roman"/>
+              <a:ea typeface="Times New Roman"/>
+              <a:cs typeface="Times New Roman"/>
+              <a:sym typeface="Times New Roman"/>
+            </a:endParaRPr>
+          </a:p>
+        </p:txBody>
+      </p:sp>
+      <p:sp>
+        <p:nvSpPr>
+          <p:cNvPr id="181" name="Google Shape;181;p25"/>
+          <p:cNvSpPr txBox="1">
+            <a:spLocks noGrp="1"/>
+          </p:cNvSpPr>
+          <p:nvPr>
+            <p:ph type="title"/>
+          </p:nvPr>
+        </p:nvSpPr>
+        <p:spPr>
+          <a:xfrm>
+            <a:off x="1451579" y="804519"/>
+            <a:ext cx="9603300" cy="1049100"/>
+          </a:xfrm>
+          <a:prstGeom prst="rect">
+            <a:avLst/>
+          </a:prstGeom>
+          <a:noFill/>
+          <a:ln>
+            <a:noFill/>
+          </a:ln>
+        </p:spPr>
+        <p:txBody>
+          <a:bodyPr spcFirstLastPara="1" wrap="square" lIns="91425" tIns="45700" rIns="91425" bIns="45700" anchor="t" anchorCtr="0">
+            <a:noAutofit/>
+          </a:bodyPr>
+          <a:lstStyle/>
+          <a:p>
+            <a:pPr marL="0" lvl="0" indent="0" algn="l" rtl="0">
+              <a:lnSpc>
+                <a:spcPct val="90000"/>
+              </a:lnSpc>
+              <a:spcBef>
+                <a:spcPts val="0"/>
+              </a:spcBef>
+              <a:spcAft>
+                <a:spcPts val="0"/>
+              </a:spcAft>
+              <a:buClr>
+                <a:schemeClr val="dk1"/>
+              </a:buClr>
+              <a:buSzPts val="3200"/>
+              <a:buFont typeface="Times New Roman"/>
+              <a:buNone/>
+            </a:pPr>
+            <a:r>
+              <a:rPr lang="en-US" dirty="0">
+                <a:latin typeface="Times New Roman"/>
+                <a:ea typeface="Times New Roman"/>
+                <a:cs typeface="Times New Roman"/>
+                <a:sym typeface="Times New Roman"/>
+              </a:rPr>
+              <a:t>III- BIỂU ĐỒ</a:t>
+            </a:r>
+            <a:endParaRPr dirty="0"/>
+          </a:p>
+        </p:txBody>
+      </p:sp>
+      <p:pic>
+        <p:nvPicPr>
+          <p:cNvPr id="3" name="Picture 2">
+            <a:extLst>
+              <a:ext uri="{FF2B5EF4-FFF2-40B4-BE49-F238E27FC236}">
+                <a16:creationId xmlns:a16="http://schemas.microsoft.com/office/drawing/2014/main" id="{54A19BAA-34D8-4EA6-91DB-5DF7629344D0}"/>
+              </a:ext>
+            </a:extLst>
+          </p:cNvPr>
+          <p:cNvPicPr>
+            <a:picLocks noChangeAspect="1"/>
+          </p:cNvPicPr>
+          <p:nvPr/>
+        </p:nvPicPr>
+        <p:blipFill>
+          <a:blip r:embed="rId3"/>
+          <a:stretch>
+            <a:fillRect/>
+          </a:stretch>
+        </p:blipFill>
+        <p:spPr>
+          <a:xfrm>
+            <a:off x="2596897" y="2325181"/>
+            <a:ext cx="6998206" cy="4440680"/>
+          </a:xfrm>
+          <a:prstGeom prst="rect">
+            <a:avLst/>
+          </a:prstGeom>
+        </p:spPr>
+      </p:pic>
+    </p:spTree>
+    <p:extLst>
+      <p:ext uri="{BB962C8B-B14F-4D97-AF65-F5344CB8AC3E}">
+        <p14:creationId xmlns:p14="http://schemas.microsoft.com/office/powerpoint/2010/main" val="2521163908"/>
+      </p:ext>
+    </p:extLst>
+  </p:cSld>
+  <p:clrMapOvr>
+    <a:masterClrMapping/>
+  </p:clrMapOvr>
+  <mc:AlternateContent xmlns:mc="http://schemas.openxmlformats.org/markup-compatibility/2006" xmlns:p14="http://schemas.microsoft.com/office/powerpoint/2010/main">
+    <mc:Choice Requires="p14">
+      <p:transition spd="med" p14:dur="700">
+        <p:fade/>
+      </p:transition>
+    </mc:Choice>
+    <mc:Fallback xmlns:p15="http://schemas.microsoft.com/office/powerpoint/2012/main" xmlns:com="http://schemas.openxmlformats.org/drawingml/2006/compatibility" xmlns:pvml="urn:schemas-microsoft-com:office:powerpoint" xmlns:v="urn:schemas-microsoft-com:vml" xmlns:o="urn:schemas-microsoft-com:office:office" xmlns:dgm="http://schemas.openxmlformats.org/drawingml/2006/diagram" xmlns:c="http://schemas.openxmlformats.org/drawingml/2006/chart" xmlns:mv="urn:schemas-microsoft-com:mac:vml" xmlns="">
+      <p:transition spd="slow">
+        <p:fade/>
+      </p:transition>
+    </mc:Fallback>
+  </mc:AlternateContent>
+  <p:timing>
+    <p:tnLst>
+      <p:par>
+        <p:cTn id="1" dur="indefinite" restart="never" nodeType="tmRoot">
+          <p:childTnLst>
+            <p:seq concurrent="1" nextAc="seek">
+              <p:cTn id="2" dur="indefinite" nodeType="mainSeq">
+                <p:childTnLst>
+                  <p:par>
+                    <p:cTn id="3" fill="hold">
+                      <p:stCondLst>
+                        <p:cond delay="indefinite"/>
+                      </p:stCondLst>
+                      <p:childTnLst>
+                        <p:par>
+                          <p:cTn id="4" fill="hold">
+                            <p:stCondLst>
+                              <p:cond delay="0"/>
+                            </p:stCondLst>
+                            <p:childTnLst>
+                              <p:par>
+                                <p:cTn id="5" presetID="1" presetClass="entr" presetSubtype="0" fill="hold" nodeType="clickEffect">
+                                  <p:stCondLst>
+                                    <p:cond delay="0"/>
+                                  </p:stCondLst>
+                                  <p:childTnLst>
+                                    <p:set>
+                                      <p:cBhvr>
+                                        <p:cTn id="6" dur="1" fill="hold">
+                                          <p:stCondLst>
+                                            <p:cond delay="0"/>
+                                          </p:stCondLst>
+                                        </p:cTn>
+                                        <p:tgtEl>
+                                          <p:spTgt spid="180">
+                                            <p:txEl>
+                                              <p:pRg st="0" end="0"/>
+                                            </p:txEl>
+                                          </p:spTgt>
+                                        </p:tgtEl>
+                                        <p:attrNameLst>
+                                          <p:attrName>style.visibility</p:attrName>
+                                        </p:attrNameLst>
+                                      </p:cBhvr>
+                                      <p:to>
+                                        <p:strVal val="visible"/>
+                                      </p:to>
+                                    </p:set>
+                                  </p:childTnLst>
+                                </p:cTn>
+                              </p:par>
+                            </p:childTnLst>
+                          </p:cTn>
+                        </p:par>
+                      </p:childTnLst>
+                    </p:cTn>
+                  </p:par>
+                </p:childTnLst>
+              </p:cTn>
+              <p:prevCondLst>
+                <p:cond evt="onPrev" delay="0">
+                  <p:tgtEl>
+                    <p:sldTgt/>
+                  </p:tgtEl>
+                </p:cond>
+              </p:prevCondLst>
+              <p:nextCondLst>
+                <p:cond evt="onNext" delay="0">
+                  <p:tgtEl>
+                    <p:sldTgt/>
+                  </p:tgtEl>
+                </p:cond>
+              </p:nextCondLst>
+            </p:seq>
+          </p:childTnLst>
+        </p:cTn>
+      </p:par>
+    </p:tnLst>
+  </p:timing>
+</p:sld>
+</file>
+
+<file path=ppt/slides/slide22.xml><?xml version="1.0" encoding="utf-8"?>
+<p:sld xmlns:a="http://schemas.openxmlformats.org/drawingml/2006/main" xmlns:r="http://schemas.openxmlformats.org/officeDocument/2006/relationships" xmlns:p="http://schemas.openxmlformats.org/presentationml/2006/main">
+  <p:cSld>
+    <p:spTree>
+      <p:nvGrpSpPr>
+        <p:cNvPr id="1" name="Shape 179"/>
+        <p:cNvGrpSpPr/>
+        <p:nvPr/>
+      </p:nvGrpSpPr>
+      <p:grpSpPr>
+        <a:xfrm>
+          <a:off x="0" y="0"/>
+          <a:ext cx="0" cy="0"/>
+          <a:chOff x="0" y="0"/>
+          <a:chExt cx="0" cy="0"/>
+        </a:xfrm>
+      </p:grpSpPr>
+      <p:sp>
+        <p:nvSpPr>
+          <p:cNvPr id="180" name="Google Shape;180;p25"/>
+          <p:cNvSpPr txBox="1">
+            <a:spLocks noGrp="1"/>
+          </p:cNvSpPr>
+          <p:nvPr>
+            <p:ph type="body" idx="1"/>
+          </p:nvPr>
+        </p:nvSpPr>
+        <p:spPr>
+          <a:xfrm>
+            <a:off x="1451579" y="1853619"/>
+            <a:ext cx="9603300" cy="3450600"/>
+          </a:xfrm>
+          <a:prstGeom prst="rect">
+            <a:avLst/>
+          </a:prstGeom>
+          <a:noFill/>
+          <a:ln>
+            <a:noFill/>
+          </a:ln>
+        </p:spPr>
+        <p:txBody>
+          <a:bodyPr spcFirstLastPara="1" wrap="square" lIns="91425" tIns="45700" rIns="91425" bIns="45700" anchor="t" anchorCtr="0">
+            <a:noAutofit/>
+          </a:bodyPr>
+          <a:lstStyle/>
+          <a:p>
+            <a:pPr marL="228600" lvl="0" indent="0" algn="l" rtl="0">
+              <a:lnSpc>
+                <a:spcPct val="120000"/>
+              </a:lnSpc>
+              <a:spcBef>
+                <a:spcPts val="0"/>
+              </a:spcBef>
+              <a:spcAft>
+                <a:spcPts val="0"/>
+              </a:spcAft>
+              <a:buNone/>
+            </a:pPr>
+            <a:r>
+              <a:rPr lang="en-US" dirty="0">
+                <a:latin typeface="Times New Roman"/>
+                <a:ea typeface="Times New Roman"/>
+                <a:cs typeface="Times New Roman"/>
+                <a:sym typeface="Times New Roman"/>
+              </a:rPr>
+              <a:t>2.1 </a:t>
+            </a:r>
+            <a:r>
+              <a:rPr lang="en-US" dirty="0" err="1">
+                <a:latin typeface="Times New Roman"/>
+                <a:ea typeface="Times New Roman"/>
+                <a:cs typeface="Times New Roman"/>
+                <a:sym typeface="Times New Roman"/>
+              </a:rPr>
+              <a:t>Biểu</a:t>
+            </a:r>
+            <a:r>
+              <a:rPr lang="en-US" dirty="0">
+                <a:latin typeface="Times New Roman"/>
+                <a:ea typeface="Times New Roman"/>
+                <a:cs typeface="Times New Roman"/>
+                <a:sym typeface="Times New Roman"/>
+              </a:rPr>
+              <a:t> </a:t>
+            </a:r>
+            <a:r>
+              <a:rPr lang="en-US" dirty="0" err="1">
+                <a:latin typeface="Times New Roman"/>
+                <a:ea typeface="Times New Roman"/>
+                <a:cs typeface="Times New Roman"/>
+                <a:sym typeface="Times New Roman"/>
+              </a:rPr>
+              <a:t>đồ</a:t>
+            </a:r>
+            <a:r>
+              <a:rPr lang="en-US" dirty="0">
+                <a:latin typeface="Times New Roman"/>
+                <a:ea typeface="Times New Roman"/>
+                <a:cs typeface="Times New Roman"/>
+                <a:sym typeface="Times New Roman"/>
+              </a:rPr>
+              <a:t> </a:t>
+            </a:r>
+            <a:r>
+              <a:rPr lang="en-US" dirty="0" err="1">
+                <a:latin typeface="Times New Roman"/>
+                <a:ea typeface="Times New Roman"/>
+                <a:cs typeface="Times New Roman"/>
+                <a:sym typeface="Times New Roman"/>
+              </a:rPr>
+              <a:t>lớp</a:t>
+            </a:r>
+            <a:r>
+              <a:rPr lang="en-US" dirty="0">
+                <a:latin typeface="Times New Roman"/>
+                <a:ea typeface="Times New Roman"/>
+                <a:cs typeface="Times New Roman"/>
+                <a:sym typeface="Times New Roman"/>
+              </a:rPr>
+              <a:t> </a:t>
+            </a:r>
+            <a:r>
+              <a:rPr lang="en-US" dirty="0" err="1">
+                <a:latin typeface="Times New Roman"/>
+                <a:ea typeface="Times New Roman"/>
+                <a:cs typeface="Times New Roman"/>
+                <a:sym typeface="Times New Roman"/>
+              </a:rPr>
+              <a:t>quản</a:t>
+            </a:r>
+            <a:r>
+              <a:rPr lang="en-US" dirty="0">
+                <a:latin typeface="Times New Roman"/>
+                <a:ea typeface="Times New Roman"/>
+                <a:cs typeface="Times New Roman"/>
+                <a:sym typeface="Times New Roman"/>
+              </a:rPr>
+              <a:t> </a:t>
+            </a:r>
+            <a:r>
+              <a:rPr lang="en-US">
+                <a:latin typeface="Times New Roman"/>
+                <a:ea typeface="Times New Roman"/>
+                <a:cs typeface="Times New Roman"/>
+                <a:sym typeface="Times New Roman"/>
+              </a:rPr>
+              <a:t>lý </a:t>
+            </a:r>
+            <a:r>
+              <a:rPr lang="en-US" dirty="0" err="1">
+                <a:latin typeface="Times New Roman"/>
+                <a:ea typeface="Times New Roman"/>
+                <a:cs typeface="Times New Roman"/>
+                <a:sym typeface="Times New Roman"/>
+              </a:rPr>
+              <a:t>thuốc</a:t>
+            </a:r>
+            <a:endParaRPr dirty="0">
+              <a:latin typeface="Times New Roman"/>
+              <a:ea typeface="Times New Roman"/>
+              <a:cs typeface="Times New Roman"/>
+              <a:sym typeface="Times New Roman"/>
+            </a:endParaRPr>
+          </a:p>
+        </p:txBody>
+      </p:sp>
+      <p:sp>
+        <p:nvSpPr>
+          <p:cNvPr id="181" name="Google Shape;181;p25"/>
+          <p:cNvSpPr txBox="1">
+            <a:spLocks noGrp="1"/>
+          </p:cNvSpPr>
+          <p:nvPr>
+            <p:ph type="title"/>
+          </p:nvPr>
+        </p:nvSpPr>
+        <p:spPr>
+          <a:xfrm>
+            <a:off x="1451579" y="804519"/>
+            <a:ext cx="9603300" cy="1049100"/>
+          </a:xfrm>
+          <a:prstGeom prst="rect">
+            <a:avLst/>
+          </a:prstGeom>
+          <a:noFill/>
+          <a:ln>
+            <a:noFill/>
+          </a:ln>
+        </p:spPr>
+        <p:txBody>
+          <a:bodyPr spcFirstLastPara="1" wrap="square" lIns="91425" tIns="45700" rIns="91425" bIns="45700" anchor="t" anchorCtr="0">
+            <a:noAutofit/>
+          </a:bodyPr>
+          <a:lstStyle/>
+          <a:p>
+            <a:pPr marL="0" lvl="0" indent="0" algn="l" rtl="0">
+              <a:lnSpc>
+                <a:spcPct val="90000"/>
+              </a:lnSpc>
+              <a:spcBef>
+                <a:spcPts val="0"/>
+              </a:spcBef>
+              <a:spcAft>
+                <a:spcPts val="0"/>
+              </a:spcAft>
+              <a:buClr>
+                <a:schemeClr val="dk1"/>
+              </a:buClr>
+              <a:buSzPts val="3200"/>
+              <a:buFont typeface="Times New Roman"/>
+              <a:buNone/>
+            </a:pPr>
+            <a:r>
+              <a:rPr lang="en-US" dirty="0">
+                <a:latin typeface="Times New Roman"/>
+                <a:ea typeface="Times New Roman"/>
+                <a:cs typeface="Times New Roman"/>
+                <a:sym typeface="Times New Roman"/>
+              </a:rPr>
+              <a:t>III- BIỂU ĐỒ</a:t>
+            </a:r>
+            <a:endParaRPr dirty="0"/>
+          </a:p>
+        </p:txBody>
+      </p:sp>
+      <p:pic>
+        <p:nvPicPr>
+          <p:cNvPr id="4" name="Picture 3">
+            <a:extLst>
+              <a:ext uri="{FF2B5EF4-FFF2-40B4-BE49-F238E27FC236}">
+                <a16:creationId xmlns:a16="http://schemas.microsoft.com/office/drawing/2014/main" id="{F4BE8821-207D-440A-9271-F4F09514EEA6}"/>
+              </a:ext>
+            </a:extLst>
+          </p:cNvPr>
+          <p:cNvPicPr>
+            <a:picLocks noChangeAspect="1"/>
+          </p:cNvPicPr>
+          <p:nvPr/>
+        </p:nvPicPr>
+        <p:blipFill>
+          <a:blip r:embed="rId3"/>
+          <a:stretch>
+            <a:fillRect/>
+          </a:stretch>
+        </p:blipFill>
+        <p:spPr>
+          <a:xfrm>
+            <a:off x="2489982" y="2380904"/>
+            <a:ext cx="8102991" cy="4477096"/>
+          </a:xfrm>
+          <a:prstGeom prst="rect">
+            <a:avLst/>
+          </a:prstGeom>
+        </p:spPr>
+      </p:pic>
+    </p:spTree>
+    <p:extLst>
+      <p:ext uri="{BB962C8B-B14F-4D97-AF65-F5344CB8AC3E}">
+        <p14:creationId xmlns:p14="http://schemas.microsoft.com/office/powerpoint/2010/main" val="2211674495"/>
+      </p:ext>
+    </p:extLst>
+  </p:cSld>
+  <p:clrMapOvr>
+    <a:masterClrMapping/>
+  </p:clrMapOvr>
+  <mc:AlternateContent xmlns:mc="http://schemas.openxmlformats.org/markup-compatibility/2006" xmlns:p14="http://schemas.microsoft.com/office/powerpoint/2010/main">
+    <mc:Choice Requires="p14">
+      <p:transition spd="med" p14:dur="700">
+        <p:fade/>
+      </p:transition>
+    </mc:Choice>
+    <mc:Fallback xmlns:p15="http://schemas.microsoft.com/office/powerpoint/2012/main" xmlns:com="http://schemas.openxmlformats.org/drawingml/2006/compatibility" xmlns:pvml="urn:schemas-microsoft-com:office:powerpoint" xmlns:v="urn:schemas-microsoft-com:vml" xmlns:o="urn:schemas-microsoft-com:office:office" xmlns:dgm="http://schemas.openxmlformats.org/drawingml/2006/diagram" xmlns:c="http://schemas.openxmlformats.org/drawingml/2006/chart" xmlns:mv="urn:schemas-microsoft-com:mac:vml" xmlns="">
+      <p:transition spd="slow">
+        <p:fade/>
+      </p:transition>
+    </mc:Fallback>
+  </mc:AlternateContent>
+  <p:timing>
+    <p:tnLst>
+      <p:par>
+        <p:cTn id="1" dur="indefinite" restart="never" nodeType="tmRoot">
+          <p:childTnLst>
+            <p:seq concurrent="1" nextAc="seek">
+              <p:cTn id="2" dur="indefinite" nodeType="mainSeq">
+                <p:childTnLst>
+                  <p:par>
+                    <p:cTn id="3" fill="hold">
+                      <p:stCondLst>
+                        <p:cond delay="indefinite"/>
+                      </p:stCondLst>
+                      <p:childTnLst>
+                        <p:par>
+                          <p:cTn id="4" fill="hold">
+                            <p:stCondLst>
+                              <p:cond delay="0"/>
+                            </p:stCondLst>
+                            <p:childTnLst>
+                              <p:par>
+                                <p:cTn id="5" presetID="1" presetClass="entr" presetSubtype="0" fill="hold" nodeType="clickEffect">
+                                  <p:stCondLst>
+                                    <p:cond delay="0"/>
+                                  </p:stCondLst>
+                                  <p:childTnLst>
+                                    <p:set>
+                                      <p:cBhvr>
+                                        <p:cTn id="6" dur="1" fill="hold">
+                                          <p:stCondLst>
+                                            <p:cond delay="0"/>
+                                          </p:stCondLst>
+                                        </p:cTn>
+                                        <p:tgtEl>
+                                          <p:spTgt spid="180">
+                                            <p:txEl>
+                                              <p:pRg st="0" end="0"/>
+                                            </p:txEl>
+                                          </p:spTgt>
+                                        </p:tgtEl>
+                                        <p:attrNameLst>
+                                          <p:attrName>style.visibility</p:attrName>
+                                        </p:attrNameLst>
+                                      </p:cBhvr>
+                                      <p:to>
+                                        <p:strVal val="visible"/>
+                                      </p:to>
+                                    </p:set>
+                                  </p:childTnLst>
+                                </p:cTn>
+                              </p:par>
+                            </p:childTnLst>
+                          </p:cTn>
+                        </p:par>
+                      </p:childTnLst>
+                    </p:cTn>
+                  </p:par>
+                </p:childTnLst>
+              </p:cTn>
+              <p:prevCondLst>
+                <p:cond evt="onPrev" delay="0">
+                  <p:tgtEl>
+                    <p:sldTgt/>
+                  </p:tgtEl>
+                </p:cond>
+              </p:prevCondLst>
+              <p:nextCondLst>
+                <p:cond evt="onNext" delay="0">
+                  <p:tgtEl>
+                    <p:sldTgt/>
+                  </p:tgtEl>
+                </p:cond>
+              </p:nextCondLst>
+            </p:seq>
+          </p:childTnLst>
+        </p:cTn>
+      </p:par>
+    </p:tnLst>
+  </p:timing>
+</p:sld>
+</file>
+
+<file path=ppt/slides/slide23.xml><?xml version="1.0" encoding="utf-8"?>
+<p:sld xmlns:a="http://schemas.openxmlformats.org/drawingml/2006/main" xmlns:r="http://schemas.openxmlformats.org/officeDocument/2006/relationships" xmlns:p="http://schemas.openxmlformats.org/presentationml/2006/main">
+  <p:cSld>
+    <p:spTree>
+      <p:nvGrpSpPr>
+        <p:cNvPr id="1" name="Shape 197"/>
+        <p:cNvGrpSpPr/>
+        <p:nvPr/>
+      </p:nvGrpSpPr>
+      <p:grpSpPr>
+        <a:xfrm>
+          <a:off x="0" y="0"/>
+          <a:ext cx="0" cy="0"/>
+          <a:chOff x="0" y="0"/>
+          <a:chExt cx="0" cy="0"/>
+        </a:xfrm>
+      </p:grpSpPr>
+      <p:sp>
+        <p:nvSpPr>
+          <p:cNvPr id="198" name="Google Shape;198;p28"/>
+          <p:cNvSpPr txBox="1">
+            <a:spLocks noGrp="1"/>
+          </p:cNvSpPr>
+          <p:nvPr>
+            <p:ph type="title"/>
+          </p:nvPr>
+        </p:nvSpPr>
+        <p:spPr>
+          <a:xfrm>
+            <a:off x="1451579" y="804519"/>
+            <a:ext cx="9603275" cy="1049235"/>
+          </a:xfrm>
+          <a:prstGeom prst="rect">
+            <a:avLst/>
+          </a:prstGeom>
+          <a:noFill/>
+          <a:ln>
+            <a:noFill/>
+          </a:ln>
+        </p:spPr>
+        <p:txBody>
+          <a:bodyPr spcFirstLastPara="1" wrap="square" lIns="91425" tIns="45700" rIns="91425" bIns="45700" anchor="t" anchorCtr="0">
+            <a:noAutofit/>
+          </a:bodyPr>
+          <a:lstStyle/>
+          <a:p>
+            <a:pPr marL="0" lvl="0" indent="0" algn="l" rtl="0">
+              <a:lnSpc>
+                <a:spcPct val="90000"/>
+              </a:lnSpc>
+              <a:spcBef>
+                <a:spcPts val="0"/>
+              </a:spcBef>
+              <a:spcAft>
+                <a:spcPts val="0"/>
+              </a:spcAft>
+              <a:buClr>
+                <a:schemeClr val="dk1"/>
+              </a:buClr>
+              <a:buSzPts val="3200"/>
+              <a:buFont typeface="Times New Roman"/>
+              <a:buNone/>
+            </a:pPr>
+            <a:r>
+              <a:rPr lang="en-US">
+                <a:latin typeface="Times New Roman"/>
+                <a:ea typeface="Times New Roman"/>
+                <a:cs typeface="Times New Roman"/>
+                <a:sym typeface="Times New Roman"/>
+              </a:rPr>
+              <a:t>TÀI LIỆU THAM KHẢO</a:t>
+            </a:r>
+            <a:endParaRPr>
+              <a:latin typeface="Times New Roman"/>
+              <a:ea typeface="Times New Roman"/>
+              <a:cs typeface="Times New Roman"/>
+              <a:sym typeface="Times New Roman"/>
+            </a:endParaRPr>
+          </a:p>
+        </p:txBody>
+      </p:sp>
+      <p:sp>
+        <p:nvSpPr>
+          <p:cNvPr id="199" name="Google Shape;199;p28"/>
+          <p:cNvSpPr txBox="1">
+            <a:spLocks noGrp="1"/>
+          </p:cNvSpPr>
+          <p:nvPr>
+            <p:ph type="body" idx="1"/>
+          </p:nvPr>
+        </p:nvSpPr>
+        <p:spPr>
+          <a:xfrm>
+            <a:off x="1451579" y="2015732"/>
+            <a:ext cx="9603275" cy="3450613"/>
+          </a:xfrm>
+          <a:prstGeom prst="rect">
+            <a:avLst/>
+          </a:prstGeom>
+          <a:noFill/>
+          <a:ln>
+            <a:noFill/>
+          </a:ln>
+        </p:spPr>
+        <p:txBody>
+          <a:bodyPr spcFirstLastPara="1" wrap="square" lIns="91425" tIns="45700" rIns="91425" bIns="45700" anchor="t" anchorCtr="0">
+            <a:noAutofit/>
+          </a:bodyPr>
+          <a:lstStyle/>
+          <a:p>
+            <a:pPr marL="228600" lvl="0" indent="-228600" algn="l" rtl="0">
+              <a:lnSpc>
+                <a:spcPct val="120000"/>
+              </a:lnSpc>
+              <a:spcBef>
+                <a:spcPts val="0"/>
+              </a:spcBef>
+              <a:spcAft>
+                <a:spcPts val="0"/>
+              </a:spcAft>
+              <a:buSzPts val="2000"/>
+              <a:buChar char="•"/>
+            </a:pPr>
+            <a:endParaRPr dirty="0"/>
+          </a:p>
+          <a:p>
+            <a:pPr marL="228600" lvl="0" indent="-228600" algn="l" rtl="0">
+              <a:lnSpc>
+                <a:spcPct val="120000"/>
+              </a:lnSpc>
+              <a:spcBef>
+                <a:spcPts val="1000"/>
+              </a:spcBef>
+              <a:spcAft>
+                <a:spcPts val="0"/>
+              </a:spcAft>
+              <a:buSzPts val="2000"/>
+              <a:buChar char="•"/>
+            </a:pPr>
+            <a:endParaRPr dirty="0"/>
+          </a:p>
+        </p:txBody>
+      </p:sp>
+    </p:spTree>
+  </p:cSld>
+  <p:clrMapOvr>
+    <a:masterClrMapping/>
+  </p:clrMapOvr>
+  <mc:AlternateContent xmlns:mc="http://schemas.openxmlformats.org/markup-compatibility/2006" xmlns:p14="http://schemas.microsoft.com/office/powerpoint/2010/main">
+    <mc:Choice Requires="p14">
+      <p:transition spd="med" p14:dur="700">
+        <p:fade/>
+      </p:transition>
+    </mc:Choice>
+    <mc:Fallback xmlns:p15="http://schemas.microsoft.com/office/powerpoint/2012/main" xmlns:com="http://schemas.openxmlformats.org/drawingml/2006/compatibility" xmlns:pvml="urn:schemas-microsoft-com:office:powerpoint" xmlns:v="urn:schemas-microsoft-com:vml" xmlns:o="urn:schemas-microsoft-com:office:office" xmlns:dgm="http://schemas.openxmlformats.org/drawingml/2006/diagram" xmlns:c="http://schemas.openxmlformats.org/drawingml/2006/chart" xmlns:mv="urn:schemas-microsoft-com:mac:vml" xmlns="">
+      <p:transition spd="slow">
+        <p:fade/>
+      </p:transition>
+    </mc:Fallback>
+  </mc:AlternateContent>
+  <p:timing>
+    <p:tnLst>
+      <p:par>
+        <p:cTn id="1" dur="indefinite" restart="never" nodeType="tmRoot">
+          <p:childTnLst>
+            <p:seq concurrent="1" nextAc="seek">
+              <p:cTn id="2" dur="indefinite" nodeType="mainSeq">
+                <p:childTnLst>
+                  <p:par>
+                    <p:cTn id="3" fill="hold">
+                      <p:stCondLst>
+                        <p:cond delay="indefinite"/>
+                      </p:stCondLst>
+                      <p:childTnLst>
+                        <p:par>
+                          <p:cTn id="4" fill="hold">
+                            <p:stCondLst>
+                              <p:cond delay="0"/>
+                            </p:stCondLst>
+                            <p:childTnLst>
+                              <p:par>
+                                <p:cTn id="5" presetID="1" presetClass="entr" presetSubtype="0" fill="hold" nodeType="clickEffect">
+                                  <p:stCondLst>
+                                    <p:cond delay="0"/>
+                                  </p:stCondLst>
+                                  <p:childTnLst>
+                                    <p:set>
+                                      <p:cBhvr>
+                                        <p:cTn id="6" dur="1" fill="hold">
+                                          <p:stCondLst>
+                                            <p:cond delay="0"/>
+                                          </p:stCondLst>
+                                        </p:cTn>
+                                        <p:tgtEl>
+                                          <p:spTgt spid="198"/>
+                                        </p:tgtEl>
+                                        <p:attrNameLst>
+                                          <p:attrName>style.visibility</p:attrName>
+                                        </p:attrNameLst>
+                                      </p:cBhvr>
+                                      <p:to>
+                                        <p:strVal val="visible"/>
+                                      </p:to>
+                                    </p:set>
+                                  </p:childTnLst>
+                                </p:cTn>
+                              </p:par>
+                            </p:childTnLst>
+                          </p:cTn>
+                        </p:par>
+                      </p:childTnLst>
+                    </p:cTn>
+                  </p:par>
+                  <p:par>
+                    <p:cTn id="7" fill="hold">
+                      <p:stCondLst>
+                        <p:cond delay="indefinite"/>
+                      </p:stCondLst>
+                      <p:childTnLst>
+                        <p:par>
+                          <p:cTn id="8" fill="hold">
+                            <p:stCondLst>
+                              <p:cond delay="0"/>
+                            </p:stCondLst>
+                            <p:childTnLst>
+                              <p:par>
+                                <p:cTn id="9" presetID="1" presetClass="entr" presetSubtype="0" fill="hold" nodeType="clickEffect" nodePh="1">
+                                  <p:stCondLst>
+                                    <p:cond delay="0"/>
+                                  </p:stCondLst>
+                                  <p:endCondLst>
+                                    <p:cond evt="begin" delay="0">
+                                      <p:tn val="9"/>
+                                    </p:cond>
+                                  </p:endCondLst>
+                                  <p:childTnLst>
+                                    <p:set>
+                                      <p:cBhvr>
+                                        <p:cTn id="10" dur="1" fill="hold">
+                                          <p:stCondLst>
+                                            <p:cond delay="0"/>
+                                          </p:stCondLst>
+                                        </p:cTn>
+                                        <p:tgtEl>
+                                          <p:spTgt spid="199">
+                                            <p:txEl>
+                                              <p:pRg st="0" end="0"/>
+                                            </p:txEl>
+                                          </p:spTgt>
+                                        </p:tgtEl>
+                                        <p:attrNameLst>
+                                          <p:attrName>style.visibility</p:attrName>
+                                        </p:attrNameLst>
+                                      </p:cBhvr>
+                                      <p:to>
+                                        <p:strVal val="visible"/>
+                                      </p:to>
+                                    </p:set>
+                                  </p:childTnLst>
+                                </p:cTn>
+                              </p:par>
+                            </p:childTnLst>
+                          </p:cTn>
+                        </p:par>
+                      </p:childTnLst>
+                    </p:cTn>
+                  </p:par>
+                </p:childTnLst>
+              </p:cTn>
+              <p:prevCondLst>
+                <p:cond evt="onPrev" delay="0">
+                  <p:tgtEl>
+                    <p:sldTgt/>
+                  </p:tgtEl>
+                </p:cond>
+              </p:prevCondLst>
+              <p:nextCondLst>
+                <p:cond evt="onNext" delay="0">
+                  <p:tgtEl>
+                    <p:sldTgt/>
+                  </p:tgtEl>
+                </p:cond>
+              </p:nextCondLst>
+            </p:seq>
+          </p:childTnLst>
+        </p:cTn>
+      </p:par>
+    </p:tnLst>
+  </p:timing>
+</p:sld>
+</file>
+
+<file path=ppt/slides/slide24.xml><?xml version="1.0" encoding="utf-8"?>
+<p:sld xmlns:a="http://schemas.openxmlformats.org/drawingml/2006/main" xmlns:r="http://schemas.openxmlformats.org/officeDocument/2006/relationships" xmlns:p="http://schemas.openxmlformats.org/presentationml/2006/main">
+  <p:cSld>
+    <p:spTree>
+      <p:nvGrpSpPr>
         <p:cNvPr id="1" name="Shape 203"/>
         <p:cNvGrpSpPr/>
         <p:nvPr/>
@@ -21438,7 +23326,7 @@
         <p:fade/>
       </p:transition>
     </mc:Choice>
-    <mc:Fallback xmlns="" xmlns:mv="urn:schemas-microsoft-com:mac:vml" xmlns:c="http://schemas.openxmlformats.org/drawingml/2006/chart" xmlns:dgm="http://schemas.openxmlformats.org/drawingml/2006/diagram" xmlns:o="urn:schemas-microsoft-com:office:office" xmlns:v="urn:schemas-microsoft-com:vml" xmlns:pvml="urn:schemas-microsoft-com:office:powerpoint" xmlns:com="http://schemas.openxmlformats.org/drawingml/2006/compatibility" xmlns:p15="http://schemas.microsoft.com/office/powerpoint/2012/main">
+    <mc:Fallback xmlns:p15="http://schemas.microsoft.com/office/powerpoint/2012/main" xmlns:com="http://schemas.openxmlformats.org/drawingml/2006/compatibility" xmlns:pvml="urn:schemas-microsoft-com:office:powerpoint" xmlns:v="urn:schemas-microsoft-com:vml" xmlns:o="urn:schemas-microsoft-com:office:office" xmlns:dgm="http://schemas.openxmlformats.org/drawingml/2006/diagram" xmlns:c="http://schemas.openxmlformats.org/drawingml/2006/chart" xmlns:mv="urn:schemas-microsoft-com:mac:vml" xmlns="">
       <p:transition spd="slow">
         <p:fade/>
       </p:transition>
@@ -21912,7 +23800,7 @@
         <p:fade/>
       </p:transition>
     </mc:Choice>
-    <mc:Fallback xmlns="" xmlns:mv="urn:schemas-microsoft-com:mac:vml" xmlns:c="http://schemas.openxmlformats.org/drawingml/2006/chart" xmlns:dgm="http://schemas.openxmlformats.org/drawingml/2006/diagram" xmlns:o="urn:schemas-microsoft-com:office:office" xmlns:v="urn:schemas-microsoft-com:vml" xmlns:pvml="urn:schemas-microsoft-com:office:powerpoint" xmlns:com="http://schemas.openxmlformats.org/drawingml/2006/compatibility" xmlns:p15="http://schemas.microsoft.com/office/powerpoint/2012/main">
+    <mc:Fallback xmlns:p15="http://schemas.microsoft.com/office/powerpoint/2012/main" xmlns:com="http://schemas.openxmlformats.org/drawingml/2006/compatibility" xmlns:pvml="urn:schemas-microsoft-com:office:powerpoint" xmlns:v="urn:schemas-microsoft-com:vml" xmlns:o="urn:schemas-microsoft-com:office:office" xmlns:dgm="http://schemas.openxmlformats.org/drawingml/2006/diagram" xmlns:c="http://schemas.openxmlformats.org/drawingml/2006/chart" xmlns:mv="urn:schemas-microsoft-com:mac:vml" xmlns="">
       <p:transition spd="slow">
         <p:fade/>
       </p:transition>
@@ -22995,7 +24883,7 @@
         <p:fade/>
       </p:transition>
     </mc:Choice>
-    <mc:Fallback xmlns="" xmlns:mv="urn:schemas-microsoft-com:mac:vml" xmlns:c="http://schemas.openxmlformats.org/drawingml/2006/chart" xmlns:dgm="http://schemas.openxmlformats.org/drawingml/2006/diagram" xmlns:o="urn:schemas-microsoft-com:office:office" xmlns:v="urn:schemas-microsoft-com:vml" xmlns:pvml="urn:schemas-microsoft-com:office:powerpoint" xmlns:com="http://schemas.openxmlformats.org/drawingml/2006/compatibility" xmlns:p15="http://schemas.microsoft.com/office/powerpoint/2012/main">
+    <mc:Fallback xmlns:p15="http://schemas.microsoft.com/office/powerpoint/2012/main" xmlns:com="http://schemas.openxmlformats.org/drawingml/2006/compatibility" xmlns:pvml="urn:schemas-microsoft-com:office:powerpoint" xmlns:v="urn:schemas-microsoft-com:vml" xmlns:o="urn:schemas-microsoft-com:office:office" xmlns:dgm="http://schemas.openxmlformats.org/drawingml/2006/diagram" xmlns:c="http://schemas.openxmlformats.org/drawingml/2006/chart" xmlns:mv="urn:schemas-microsoft-com:mac:vml" xmlns="">
       <p:transition spd="slow">
         <p:fade/>
       </p:transition>
@@ -23481,7 +25369,7 @@
         <p:fade/>
       </p:transition>
     </mc:Choice>
-    <mc:Fallback xmlns="" xmlns:mv="urn:schemas-microsoft-com:mac:vml" xmlns:c="http://schemas.openxmlformats.org/drawingml/2006/chart" xmlns:dgm="http://schemas.openxmlformats.org/drawingml/2006/diagram" xmlns:o="urn:schemas-microsoft-com:office:office" xmlns:v="urn:schemas-microsoft-com:vml" xmlns:pvml="urn:schemas-microsoft-com:office:powerpoint" xmlns:com="http://schemas.openxmlformats.org/drawingml/2006/compatibility" xmlns:p15="http://schemas.microsoft.com/office/powerpoint/2012/main">
+    <mc:Fallback xmlns:p15="http://schemas.microsoft.com/office/powerpoint/2012/main" xmlns:com="http://schemas.openxmlformats.org/drawingml/2006/compatibility" xmlns:pvml="urn:schemas-microsoft-com:office:powerpoint" xmlns:v="urn:schemas-microsoft-com:vml" xmlns:o="urn:schemas-microsoft-com:office:office" xmlns:dgm="http://schemas.openxmlformats.org/drawingml/2006/diagram" xmlns:c="http://schemas.openxmlformats.org/drawingml/2006/chart" xmlns:mv="urn:schemas-microsoft-com:mac:vml" xmlns="">
       <p:transition spd="slow">
         <p:fade/>
       </p:transition>
@@ -25278,7 +27166,7 @@
         <p:fade/>
       </p:transition>
     </mc:Choice>
-    <mc:Fallback xmlns="" xmlns:mv="urn:schemas-microsoft-com:mac:vml" xmlns:c="http://schemas.openxmlformats.org/drawingml/2006/chart" xmlns:dgm="http://schemas.openxmlformats.org/drawingml/2006/diagram" xmlns:o="urn:schemas-microsoft-com:office:office" xmlns:v="urn:schemas-microsoft-com:vml" xmlns:pvml="urn:schemas-microsoft-com:office:powerpoint" xmlns:com="http://schemas.openxmlformats.org/drawingml/2006/compatibility" xmlns:p15="http://schemas.microsoft.com/office/powerpoint/2012/main">
+    <mc:Fallback xmlns:p15="http://schemas.microsoft.com/office/powerpoint/2012/main" xmlns:com="http://schemas.openxmlformats.org/drawingml/2006/compatibility" xmlns:pvml="urn:schemas-microsoft-com:office:powerpoint" xmlns:v="urn:schemas-microsoft-com:vml" xmlns:o="urn:schemas-microsoft-com:office:office" xmlns:dgm="http://schemas.openxmlformats.org/drawingml/2006/diagram" xmlns:c="http://schemas.openxmlformats.org/drawingml/2006/chart" xmlns:mv="urn:schemas-microsoft-com:mac:vml" xmlns="">
       <p:transition spd="slow">
         <p:fade/>
       </p:transition>
@@ -27712,7 +29600,7 @@
         <p:fade/>
       </p:transition>
     </mc:Choice>
-    <mc:Fallback xmlns="" xmlns:mv="urn:schemas-microsoft-com:mac:vml" xmlns:c="http://schemas.openxmlformats.org/drawingml/2006/chart" xmlns:dgm="http://schemas.openxmlformats.org/drawingml/2006/diagram" xmlns:o="urn:schemas-microsoft-com:office:office" xmlns:v="urn:schemas-microsoft-com:vml" xmlns:pvml="urn:schemas-microsoft-com:office:powerpoint" xmlns:com="http://schemas.openxmlformats.org/drawingml/2006/compatibility" xmlns:p15="http://schemas.microsoft.com/office/powerpoint/2012/main">
+    <mc:Fallback xmlns:p15="http://schemas.microsoft.com/office/powerpoint/2012/main" xmlns:com="http://schemas.openxmlformats.org/drawingml/2006/compatibility" xmlns:pvml="urn:schemas-microsoft-com:office:powerpoint" xmlns:v="urn:schemas-microsoft-com:vml" xmlns:o="urn:schemas-microsoft-com:office:office" xmlns:dgm="http://schemas.openxmlformats.org/drawingml/2006/diagram" xmlns:c="http://schemas.openxmlformats.org/drawingml/2006/chart" xmlns:mv="urn:schemas-microsoft-com:mac:vml" xmlns="">
       <p:transition spd="slow">
         <p:fade/>
       </p:transition>
@@ -28746,7 +30634,7 @@
         <p:fade/>
       </p:transition>
     </mc:Choice>
-    <mc:Fallback xmlns="" xmlns:mv="urn:schemas-microsoft-com:mac:vml" xmlns:c="http://schemas.openxmlformats.org/drawingml/2006/chart" xmlns:dgm="http://schemas.openxmlformats.org/drawingml/2006/diagram" xmlns:o="urn:schemas-microsoft-com:office:office" xmlns:v="urn:schemas-microsoft-com:vml" xmlns:pvml="urn:schemas-microsoft-com:office:powerpoint" xmlns:com="http://schemas.openxmlformats.org/drawingml/2006/compatibility" xmlns:p15="http://schemas.microsoft.com/office/powerpoint/2012/main">
+    <mc:Fallback xmlns:p15="http://schemas.microsoft.com/office/powerpoint/2012/main" xmlns:com="http://schemas.openxmlformats.org/drawingml/2006/compatibility" xmlns:pvml="urn:schemas-microsoft-com:office:powerpoint" xmlns:v="urn:schemas-microsoft-com:vml" xmlns:o="urn:schemas-microsoft-com:office:office" xmlns:dgm="http://schemas.openxmlformats.org/drawingml/2006/diagram" xmlns:c="http://schemas.openxmlformats.org/drawingml/2006/chart" xmlns:mv="urn:schemas-microsoft-com:mac:vml" xmlns="">
       <p:transition spd="slow">
         <p:fade/>
       </p:transition>
@@ -30548,7 +32436,7 @@
         <p:fade/>
       </p:transition>
     </mc:Choice>
-    <mc:Fallback xmlns="" xmlns:mv="urn:schemas-microsoft-com:mac:vml" xmlns:c="http://schemas.openxmlformats.org/drawingml/2006/chart" xmlns:dgm="http://schemas.openxmlformats.org/drawingml/2006/diagram" xmlns:o="urn:schemas-microsoft-com:office:office" xmlns:v="urn:schemas-microsoft-com:vml" xmlns:pvml="urn:schemas-microsoft-com:office:powerpoint" xmlns:com="http://schemas.openxmlformats.org/drawingml/2006/compatibility" xmlns:p15="http://schemas.microsoft.com/office/powerpoint/2012/main">
+    <mc:Fallback xmlns:p15="http://schemas.microsoft.com/office/powerpoint/2012/main" xmlns:com="http://schemas.openxmlformats.org/drawingml/2006/compatibility" xmlns:pvml="urn:schemas-microsoft-com:office:powerpoint" xmlns:v="urn:schemas-microsoft-com:vml" xmlns:o="urn:schemas-microsoft-com:office:office" xmlns:dgm="http://schemas.openxmlformats.org/drawingml/2006/diagram" xmlns:c="http://schemas.openxmlformats.org/drawingml/2006/chart" xmlns:mv="urn:schemas-microsoft-com:mac:vml" xmlns="">
       <p:transition spd="slow">
         <p:fade/>
       </p:transition>

</xml_diff>